<commit_message>
Added Toxiproxy library and interfaces. Improved README and added integration testing overview.
</commit_message>
<xml_diff>
--- a/test-automation-architecture.pptx
+++ b/test-automation-architecture.pptx
@@ -6,6 +6,7 @@
   </p:sldMasterIdLst>
   <p:sldIdLst>
     <p:sldId id="257" r:id="rId2"/>
+    <p:sldId id="258" r:id="rId3"/>
   </p:sldIdLst>
   <p:sldSz cx="12192000" cy="6858000"/>
   <p:notesSz cx="6858000" cy="9144000"/>
@@ -3328,10 +3329,10 @@
       </p:grpSpPr>
       <p:sp>
         <p:nvSpPr>
-          <p:cNvPr id="23" name="Rectangle 22">
-            <a:extLst>
-              <a:ext uri="{FF2B5EF4-FFF2-40B4-BE49-F238E27FC236}">
-                <a16:creationId xmlns:a16="http://schemas.microsoft.com/office/drawing/2014/main" id="{747DAB5B-48DB-A84B-9C96-544601B3312E}"/>
+          <p:cNvPr id="43" name="Rectangle 42">
+            <a:extLst>
+              <a:ext uri="{FF2B5EF4-FFF2-40B4-BE49-F238E27FC236}">
+                <a16:creationId xmlns:a16="http://schemas.microsoft.com/office/drawing/2014/main" id="{6C5ED255-2357-4D4D-924D-0924582E2B72}"/>
               </a:ext>
             </a:extLst>
           </p:cNvPr>
@@ -3340,7 +3341,58 @@
         </p:nvSpPr>
         <p:spPr>
           <a:xfrm>
-            <a:off x="1639335" y="148029"/>
+            <a:off x="5486094" y="4150581"/>
+            <a:ext cx="1998006" cy="2571746"/>
+          </a:xfrm>
+          <a:prstGeom prst="rect">
+            <a:avLst/>
+          </a:prstGeom>
+          <a:ln>
+            <a:prstDash val="dash"/>
+          </a:ln>
+        </p:spPr>
+        <p:style>
+          <a:lnRef idx="2">
+            <a:schemeClr val="accent2"/>
+          </a:lnRef>
+          <a:fillRef idx="1">
+            <a:schemeClr val="lt1"/>
+          </a:fillRef>
+          <a:effectRef idx="0">
+            <a:schemeClr val="accent2"/>
+          </a:effectRef>
+          <a:fontRef idx="minor">
+            <a:schemeClr val="dk1"/>
+          </a:fontRef>
+        </p:style>
+        <p:txBody>
+          <a:bodyPr rtlCol="0" anchor="b" anchorCtr="1"/>
+          <a:lstStyle/>
+          <a:p>
+            <a:pPr algn="ctr"/>
+            <a:r>
+              <a:rPr lang="en-US" sz="1200" dirty="0" err="1"/>
+              <a:t>Toxiproxy</a:t>
+            </a:r>
+            <a:endParaRPr lang="en-US" sz="1200" dirty="0"/>
+          </a:p>
+        </p:txBody>
+      </p:sp>
+      <p:sp>
+        <p:nvSpPr>
+          <p:cNvPr id="23" name="Rectangle 22">
+            <a:extLst>
+              <a:ext uri="{FF2B5EF4-FFF2-40B4-BE49-F238E27FC236}">
+                <a16:creationId xmlns:a16="http://schemas.microsoft.com/office/drawing/2014/main" id="{747DAB5B-48DB-A84B-9C96-544601B3312E}"/>
+              </a:ext>
+            </a:extLst>
+          </p:cNvPr>
+          <p:cNvSpPr/>
+          <p:nvPr/>
+        </p:nvSpPr>
+        <p:spPr>
+          <a:xfrm>
+            <a:off x="218308" y="160385"/>
             <a:ext cx="4761470" cy="3849388"/>
           </a:xfrm>
           <a:prstGeom prst="rect">
@@ -3394,7 +3446,7 @@
         </p:nvSpPr>
         <p:spPr>
           <a:xfrm>
-            <a:off x="1639335" y="4138225"/>
+            <a:off x="218308" y="4150581"/>
             <a:ext cx="4761470" cy="2571747"/>
           </a:xfrm>
           <a:prstGeom prst="rect">
@@ -3445,7 +3497,7 @@
         </p:nvSpPr>
         <p:spPr>
           <a:xfrm>
-            <a:off x="8530297" y="4575862"/>
+            <a:off x="9803033" y="4592293"/>
             <a:ext cx="2170659" cy="2153934"/>
           </a:xfrm>
           <a:prstGeom prst="rect">
@@ -3496,7 +3548,7 @@
         </p:nvSpPr>
         <p:spPr>
           <a:xfrm>
-            <a:off x="2010044" y="523619"/>
+            <a:off x="589017" y="535975"/>
             <a:ext cx="1853513" cy="1068859"/>
           </a:xfrm>
           <a:prstGeom prst="rect">
@@ -3550,7 +3602,7 @@
         </p:nvSpPr>
         <p:spPr>
           <a:xfrm>
-            <a:off x="3175695" y="2693776"/>
+            <a:off x="1754668" y="2706132"/>
             <a:ext cx="1853513" cy="1068859"/>
           </a:xfrm>
           <a:prstGeom prst="rect">
@@ -3603,7 +3655,7 @@
         </p:nvSpPr>
         <p:spPr>
           <a:xfrm>
-            <a:off x="4345474" y="523619"/>
+            <a:off x="2924447" y="535975"/>
             <a:ext cx="1853513" cy="1068859"/>
           </a:xfrm>
           <a:prstGeom prst="rect">
@@ -3654,7 +3706,7 @@
         </p:nvSpPr>
         <p:spPr>
           <a:xfrm>
-            <a:off x="6763276" y="481912"/>
+            <a:off x="5342249" y="494268"/>
             <a:ext cx="1507524" cy="1161535"/>
           </a:xfrm>
           <a:prstGeom prst="cloud">
@@ -3698,7 +3750,7 @@
         </p:nvSpPr>
         <p:spPr>
           <a:xfrm>
-            <a:off x="8950428" y="416140"/>
+            <a:off x="7529401" y="428496"/>
             <a:ext cx="1330408" cy="1283815"/>
           </a:xfrm>
           <a:prstGeom prst="ellipse">
@@ -3762,7 +3814,7 @@
         </p:nvCxnSpPr>
         <p:spPr>
           <a:xfrm>
-            <a:off x="3464025" y="1592478"/>
+            <a:off x="2042998" y="1604834"/>
             <a:ext cx="0" cy="1101298"/>
           </a:xfrm>
           <a:prstGeom prst="straightConnector1">
@@ -3801,7 +3853,7 @@
         </p:nvCxnSpPr>
         <p:spPr>
           <a:xfrm flipV="1">
-            <a:off x="4707934" y="1592478"/>
+            <a:off x="3286907" y="1604834"/>
             <a:ext cx="0" cy="1101298"/>
           </a:xfrm>
           <a:prstGeom prst="straightConnector1">
@@ -3840,7 +3892,7 @@
         </p:nvSpPr>
         <p:spPr>
           <a:xfrm>
-            <a:off x="2010044" y="1988408"/>
+            <a:off x="589017" y="2000764"/>
             <a:ext cx="1464247" cy="276999"/>
           </a:xfrm>
           <a:prstGeom prst="rect">
@@ -3884,7 +3936,7 @@
         </p:nvSpPr>
         <p:spPr>
           <a:xfrm>
-            <a:off x="2005933" y="4790821"/>
+            <a:off x="584906" y="4803177"/>
             <a:ext cx="1853513" cy="1068859"/>
           </a:xfrm>
           <a:prstGeom prst="rect">
@@ -3931,7 +3983,7 @@
         </p:nvSpPr>
         <p:spPr>
           <a:xfrm>
-            <a:off x="1643458" y="4249441"/>
+            <a:off x="222431" y="4261797"/>
             <a:ext cx="1842556" cy="276999"/>
           </a:xfrm>
           <a:prstGeom prst="rect">
@@ -3975,7 +4027,7 @@
         </p:nvSpPr>
         <p:spPr>
           <a:xfrm>
-            <a:off x="4345474" y="4790820"/>
+            <a:off x="2924447" y="4803176"/>
             <a:ext cx="1853513" cy="1068859"/>
           </a:xfrm>
           <a:prstGeom prst="rect">
@@ -4038,7 +4090,7 @@
         </p:nvSpPr>
         <p:spPr>
           <a:xfrm>
-            <a:off x="6717967" y="4575862"/>
+            <a:off x="7990703" y="4592293"/>
             <a:ext cx="1495168" cy="1498773"/>
           </a:xfrm>
           <a:prstGeom prst="diamond">
@@ -4093,7 +4145,7 @@
         </p:nvSpPr>
         <p:spPr>
           <a:xfrm>
-            <a:off x="8950422" y="4687075"/>
+            <a:off x="10223158" y="4703506"/>
             <a:ext cx="1330414" cy="1283815"/>
           </a:xfrm>
           <a:prstGeom prst="ellipse">
@@ -4147,7 +4199,7 @@
         </p:nvCxnSpPr>
         <p:spPr>
           <a:xfrm flipV="1">
-            <a:off x="3464025" y="3762635"/>
+            <a:off x="2042998" y="3774991"/>
             <a:ext cx="0" cy="1028185"/>
           </a:xfrm>
           <a:prstGeom prst="straightConnector1">
@@ -4188,7 +4240,7 @@
         </p:nvCxnSpPr>
         <p:spPr>
           <a:xfrm>
-            <a:off x="6198987" y="1058047"/>
+            <a:off x="4777960" y="1070403"/>
             <a:ext cx="568965" cy="4633"/>
           </a:xfrm>
           <a:prstGeom prst="straightConnector1">
@@ -4230,7 +4282,7 @@
         </p:nvCxnSpPr>
         <p:spPr>
           <a:xfrm flipV="1">
-            <a:off x="8269544" y="1058048"/>
+            <a:off x="6848517" y="1070404"/>
             <a:ext cx="680884" cy="4632"/>
           </a:xfrm>
           <a:prstGeom prst="straightConnector1">
@@ -4269,7 +4321,7 @@
         </p:nvCxnSpPr>
         <p:spPr>
           <a:xfrm>
-            <a:off x="4707934" y="3762635"/>
+            <a:off x="3286907" y="3774991"/>
             <a:ext cx="0" cy="1028185"/>
           </a:xfrm>
           <a:prstGeom prst="straightConnector1">
@@ -4304,15 +4356,15 @@
             </a:extLst>
           </p:cNvPr>
           <p:cNvCxnSpPr>
+            <a:cxnSpLocks/>
             <a:stCxn id="18" idx="3"/>
-            <a:endCxn id="19" idx="1"/>
           </p:cNvCxnSpPr>
           <p:nvPr/>
         </p:nvCxnSpPr>
         <p:spPr>
-          <a:xfrm flipV="1">
-            <a:off x="6198987" y="5325249"/>
-            <a:ext cx="518980" cy="1"/>
+          <a:xfrm>
+            <a:off x="4777960" y="5337606"/>
+            <a:ext cx="999466" cy="4072"/>
           </a:xfrm>
           <a:prstGeom prst="straightConnector1">
             <a:avLst/>
@@ -4353,7 +4405,7 @@
         </p:nvCxnSpPr>
         <p:spPr>
           <a:xfrm>
-            <a:off x="8213135" y="5325249"/>
+            <a:off x="9485871" y="5341680"/>
             <a:ext cx="737287" cy="3734"/>
           </a:xfrm>
           <a:prstGeom prst="straightConnector1">
@@ -4392,7 +4444,7 @@
         </p:nvSpPr>
         <p:spPr>
           <a:xfrm>
-            <a:off x="8200776" y="1668977"/>
+            <a:off x="6779749" y="1681333"/>
             <a:ext cx="766128" cy="444843"/>
           </a:xfrm>
           <a:prstGeom prst="bracePair">
@@ -4443,7 +4495,7 @@
         </p:nvCxnSpPr>
         <p:spPr>
           <a:xfrm flipH="1">
-            <a:off x="7982470" y="1511945"/>
+            <a:off x="6561443" y="1524301"/>
             <a:ext cx="1162792" cy="0"/>
           </a:xfrm>
           <a:prstGeom prst="straightConnector1">
@@ -4482,7 +4534,7 @@
         </p:nvCxnSpPr>
         <p:spPr>
           <a:xfrm flipH="1">
-            <a:off x="6198987" y="1511945"/>
+            <a:off x="4777960" y="1524301"/>
             <a:ext cx="770229" cy="0"/>
           </a:xfrm>
           <a:prstGeom prst="straightConnector1">
@@ -4521,7 +4573,7 @@
         </p:nvSpPr>
         <p:spPr>
           <a:xfrm>
-            <a:off x="8090815" y="5852213"/>
+            <a:off x="9363551" y="5868644"/>
             <a:ext cx="766128" cy="444843"/>
           </a:xfrm>
           <a:prstGeom prst="bracePair">
@@ -4571,7 +4623,7 @@
         </p:nvCxnSpPr>
         <p:spPr>
           <a:xfrm flipH="1">
-            <a:off x="7872509" y="5695181"/>
+            <a:off x="9145245" y="5711612"/>
             <a:ext cx="1162792" cy="0"/>
           </a:xfrm>
           <a:prstGeom prst="straightConnector1">
@@ -4605,13 +4657,15 @@
               </a:ext>
             </a:extLst>
           </p:cNvPr>
-          <p:cNvCxnSpPr/>
+          <p:cNvCxnSpPr>
+            <a:cxnSpLocks/>
+          </p:cNvCxnSpPr>
           <p:nvPr/>
         </p:nvCxnSpPr>
         <p:spPr>
-          <a:xfrm flipH="1">
-            <a:off x="6198987" y="5695181"/>
-            <a:ext cx="881439" cy="0"/>
+          <a:xfrm flipH="1" flipV="1">
+            <a:off x="4777961" y="5707538"/>
+            <a:ext cx="999465" cy="2"/>
           </a:xfrm>
           <a:prstGeom prst="straightConnector1">
             <a:avLst/>
@@ -4632,6 +4686,136 @@
           </a:effectRef>
           <a:fontRef idx="minor">
             <a:schemeClr val="tx1"/>
+          </a:fontRef>
+        </p:style>
+      </p:cxnSp>
+      <p:sp>
+        <p:nvSpPr>
+          <p:cNvPr id="44" name="Rectangle 43">
+            <a:extLst>
+              <a:ext uri="{FF2B5EF4-FFF2-40B4-BE49-F238E27FC236}">
+                <a16:creationId xmlns:a16="http://schemas.microsoft.com/office/drawing/2014/main" id="{1EA2494D-34E6-EA4B-8257-5AADFBABED2E}"/>
+              </a:ext>
+            </a:extLst>
+          </p:cNvPr>
+          <p:cNvSpPr/>
+          <p:nvPr/>
+        </p:nvSpPr>
+        <p:spPr>
+          <a:xfrm>
+            <a:off x="5777426" y="4803175"/>
+            <a:ext cx="1400420" cy="1064787"/>
+          </a:xfrm>
+          <a:prstGeom prst="rect">
+            <a:avLst/>
+          </a:prstGeom>
+        </p:spPr>
+        <p:style>
+          <a:lnRef idx="2">
+            <a:schemeClr val="accent2"/>
+          </a:lnRef>
+          <a:fillRef idx="1">
+            <a:schemeClr val="lt1"/>
+          </a:fillRef>
+          <a:effectRef idx="0">
+            <a:schemeClr val="accent2"/>
+          </a:effectRef>
+          <a:fontRef idx="minor">
+            <a:schemeClr val="dk1"/>
+          </a:fontRef>
+        </p:style>
+        <p:txBody>
+          <a:bodyPr rtlCol="0" anchor="ctr"/>
+          <a:lstStyle/>
+          <a:p>
+            <a:pPr algn="ctr"/>
+            <a:r>
+              <a:rPr lang="en-US" sz="1200" dirty="0" err="1"/>
+              <a:t>ToxiproxyClient</a:t>
+            </a:r>
+            <a:endParaRPr lang="en-US" sz="1200" dirty="0"/>
+          </a:p>
+        </p:txBody>
+      </p:sp>
+      <p:cxnSp>
+        <p:nvCxnSpPr>
+          <p:cNvPr id="57" name="Straight Arrow Connector 56">
+            <a:extLst>
+              <a:ext uri="{FF2B5EF4-FFF2-40B4-BE49-F238E27FC236}">
+                <a16:creationId xmlns:a16="http://schemas.microsoft.com/office/drawing/2014/main" id="{940CE4AC-CC3D-7744-B56F-3653ED86512D}"/>
+              </a:ext>
+            </a:extLst>
+          </p:cNvPr>
+          <p:cNvCxnSpPr>
+            <a:cxnSpLocks/>
+          </p:cNvCxnSpPr>
+          <p:nvPr/>
+        </p:nvCxnSpPr>
+        <p:spPr>
+          <a:xfrm>
+            <a:off x="7188959" y="5163844"/>
+            <a:ext cx="888896" cy="0"/>
+          </a:xfrm>
+          <a:prstGeom prst="straightConnector1">
+            <a:avLst/>
+          </a:prstGeom>
+          <a:ln>
+            <a:tailEnd type="triangle"/>
+          </a:ln>
+        </p:spPr>
+        <p:style>
+          <a:lnRef idx="2">
+            <a:schemeClr val="accent2"/>
+          </a:lnRef>
+          <a:fillRef idx="1">
+            <a:schemeClr val="lt1"/>
+          </a:fillRef>
+          <a:effectRef idx="0">
+            <a:schemeClr val="accent2"/>
+          </a:effectRef>
+          <a:fontRef idx="minor">
+            <a:schemeClr val="dk1"/>
+          </a:fontRef>
+        </p:style>
+      </p:cxnSp>
+      <p:cxnSp>
+        <p:nvCxnSpPr>
+          <p:cNvPr id="59" name="Straight Arrow Connector 58">
+            <a:extLst>
+              <a:ext uri="{FF2B5EF4-FFF2-40B4-BE49-F238E27FC236}">
+                <a16:creationId xmlns:a16="http://schemas.microsoft.com/office/drawing/2014/main" id="{2DB9ED9C-F2F0-5C49-9F75-45BF9F337B00}"/>
+              </a:ext>
+            </a:extLst>
+          </p:cNvPr>
+          <p:cNvCxnSpPr>
+            <a:cxnSpLocks/>
+          </p:cNvCxnSpPr>
+          <p:nvPr/>
+        </p:nvCxnSpPr>
+        <p:spPr>
+          <a:xfrm flipH="1" flipV="1">
+            <a:off x="7201321" y="5663550"/>
+            <a:ext cx="999465" cy="2"/>
+          </a:xfrm>
+          <a:prstGeom prst="straightConnector1">
+            <a:avLst/>
+          </a:prstGeom>
+          <a:ln>
+            <a:tailEnd type="triangle"/>
+          </a:ln>
+        </p:spPr>
+        <p:style>
+          <a:lnRef idx="2">
+            <a:schemeClr val="accent2"/>
+          </a:lnRef>
+          <a:fillRef idx="1">
+            <a:schemeClr val="lt1"/>
+          </a:fillRef>
+          <a:effectRef idx="0">
+            <a:schemeClr val="accent2"/>
+          </a:effectRef>
+          <a:fontRef idx="minor">
+            <a:schemeClr val="dk1"/>
           </a:fontRef>
         </p:style>
       </p:cxnSp>
@@ -4639,6 +4823,1235 @@
     <p:extLst>
       <p:ext uri="{BB962C8B-B14F-4D97-AF65-F5344CB8AC3E}">
         <p14:creationId xmlns:p14="http://schemas.microsoft.com/office/powerpoint/2010/main" val="1054766141"/>
+      </p:ext>
+    </p:extLst>
+  </p:cSld>
+  <p:clrMapOvr>
+    <a:masterClrMapping/>
+  </p:clrMapOvr>
+</p:sld>
+</file>
+
+<file path=ppt/slides/slide2.xml><?xml version="1.0" encoding="utf-8"?>
+<p:sld xmlns:a="http://schemas.openxmlformats.org/drawingml/2006/main" xmlns:r="http://schemas.openxmlformats.org/officeDocument/2006/relationships" xmlns:p="http://schemas.openxmlformats.org/presentationml/2006/main">
+  <p:cSld>
+    <p:spTree>
+      <p:nvGrpSpPr>
+        <p:cNvPr id="1" name=""/>
+        <p:cNvGrpSpPr/>
+        <p:nvPr/>
+      </p:nvGrpSpPr>
+      <p:grpSpPr>
+        <a:xfrm>
+          <a:off x="0" y="0"/>
+          <a:ext cx="0" cy="0"/>
+          <a:chOff x="0" y="0"/>
+          <a:chExt cx="0" cy="0"/>
+        </a:xfrm>
+      </p:grpSpPr>
+      <p:sp>
+        <p:nvSpPr>
+          <p:cNvPr id="4" name="Rectangle 3">
+            <a:extLst>
+              <a:ext uri="{FF2B5EF4-FFF2-40B4-BE49-F238E27FC236}">
+                <a16:creationId xmlns:a16="http://schemas.microsoft.com/office/drawing/2014/main" id="{568A3E49-0B8E-5049-BF97-69E5D44A20F8}"/>
+              </a:ext>
+            </a:extLst>
+          </p:cNvPr>
+          <p:cNvSpPr/>
+          <p:nvPr/>
+        </p:nvSpPr>
+        <p:spPr>
+          <a:xfrm>
+            <a:off x="1589907" y="1000897"/>
+            <a:ext cx="3865598" cy="1767015"/>
+          </a:xfrm>
+          <a:prstGeom prst="rect">
+            <a:avLst/>
+          </a:prstGeom>
+          <a:ln>
+            <a:prstDash val="dash"/>
+          </a:ln>
+        </p:spPr>
+        <p:style>
+          <a:lnRef idx="2">
+            <a:schemeClr val="accent6"/>
+          </a:lnRef>
+          <a:fillRef idx="1">
+            <a:schemeClr val="lt1"/>
+          </a:fillRef>
+          <a:effectRef idx="0">
+            <a:schemeClr val="accent6"/>
+          </a:effectRef>
+          <a:fontRef idx="minor">
+            <a:schemeClr val="dk1"/>
+          </a:fontRef>
+        </p:style>
+        <p:txBody>
+          <a:bodyPr rtlCol="0" anchor="t" anchorCtr="1"/>
+          <a:lstStyle/>
+          <a:p>
+            <a:pPr algn="ctr"/>
+            <a:r>
+              <a:rPr lang="en-US" sz="1200" dirty="0" err="1"/>
+              <a:t>ToxiproxyDotNetCore.Test</a:t>
+            </a:r>
+            <a:endParaRPr lang="en-US" sz="1200" dirty="0"/>
+          </a:p>
+        </p:txBody>
+      </p:sp>
+      <p:sp>
+        <p:nvSpPr>
+          <p:cNvPr id="5" name="Rectangle 4">
+            <a:extLst>
+              <a:ext uri="{FF2B5EF4-FFF2-40B4-BE49-F238E27FC236}">
+                <a16:creationId xmlns:a16="http://schemas.microsoft.com/office/drawing/2014/main" id="{401C728A-C40F-B746-AD6E-1CD90BD9609C}"/>
+              </a:ext>
+            </a:extLst>
+          </p:cNvPr>
+          <p:cNvSpPr/>
+          <p:nvPr/>
+        </p:nvSpPr>
+        <p:spPr>
+          <a:xfrm>
+            <a:off x="2229377" y="1430294"/>
+            <a:ext cx="2524883" cy="1068859"/>
+          </a:xfrm>
+          <a:prstGeom prst="rect">
+            <a:avLst/>
+          </a:prstGeom>
+        </p:spPr>
+        <p:style>
+          <a:lnRef idx="2">
+            <a:schemeClr val="accent6"/>
+          </a:lnRef>
+          <a:fillRef idx="1">
+            <a:schemeClr val="lt1"/>
+          </a:fillRef>
+          <a:effectRef idx="0">
+            <a:schemeClr val="accent6"/>
+          </a:effectRef>
+          <a:fontRef idx="minor">
+            <a:schemeClr val="dk1"/>
+          </a:fontRef>
+        </p:style>
+        <p:txBody>
+          <a:bodyPr rtlCol="0" anchor="ctr"/>
+          <a:lstStyle/>
+          <a:p>
+            <a:pPr algn="ctr"/>
+            <a:r>
+              <a:rPr lang="en-US" sz="1200" dirty="0" err="1"/>
+              <a:t>ModuleChaosTest</a:t>
+            </a:r>
+            <a:endParaRPr lang="en-US" sz="1200" dirty="0"/>
+          </a:p>
+          <a:p>
+            <a:pPr algn="ctr"/>
+            <a:r>
+              <a:rPr lang="en-US" sz="1200" dirty="0"/>
+              <a:t>.</a:t>
+            </a:r>
+            <a:r>
+              <a:rPr lang="en-US" sz="1200" dirty="0" err="1"/>
+              <a:t>Get_Echo_High_Latency_Success</a:t>
+            </a:r>
+            <a:r>
+              <a:rPr lang="en-US" sz="1200" dirty="0"/>
+              <a:t>()</a:t>
+            </a:r>
+          </a:p>
+        </p:txBody>
+      </p:sp>
+      <p:sp>
+        <p:nvSpPr>
+          <p:cNvPr id="6" name="Rectangle 5">
+            <a:extLst>
+              <a:ext uri="{FF2B5EF4-FFF2-40B4-BE49-F238E27FC236}">
+                <a16:creationId xmlns:a16="http://schemas.microsoft.com/office/drawing/2014/main" id="{8039F91C-3E7E-A64D-B0A4-AC4834AAE48F}"/>
+              </a:ext>
+            </a:extLst>
+          </p:cNvPr>
+          <p:cNvSpPr/>
+          <p:nvPr/>
+        </p:nvSpPr>
+        <p:spPr>
+          <a:xfrm>
+            <a:off x="1559020" y="3447535"/>
+            <a:ext cx="3865598" cy="2286000"/>
+          </a:xfrm>
+          <a:prstGeom prst="rect">
+            <a:avLst/>
+          </a:prstGeom>
+          <a:ln>
+            <a:prstDash val="dash"/>
+          </a:ln>
+        </p:spPr>
+        <p:style>
+          <a:lnRef idx="2">
+            <a:schemeClr val="accent6"/>
+          </a:lnRef>
+          <a:fillRef idx="1">
+            <a:schemeClr val="lt1"/>
+          </a:fillRef>
+          <a:effectRef idx="0">
+            <a:schemeClr val="accent6"/>
+          </a:effectRef>
+          <a:fontRef idx="minor">
+            <a:schemeClr val="dk1"/>
+          </a:fontRef>
+        </p:style>
+        <p:txBody>
+          <a:bodyPr rtlCol="0" anchor="b" anchorCtr="1"/>
+          <a:lstStyle/>
+          <a:p>
+            <a:pPr algn="ctr"/>
+            <a:r>
+              <a:rPr lang="en-US" sz="1200" dirty="0" err="1"/>
+              <a:t>Toxiproxy</a:t>
+            </a:r>
+            <a:endParaRPr lang="en-US" sz="1200" dirty="0"/>
+          </a:p>
+        </p:txBody>
+      </p:sp>
+      <p:sp>
+        <p:nvSpPr>
+          <p:cNvPr id="7" name="Rectangle 6">
+            <a:extLst>
+              <a:ext uri="{FF2B5EF4-FFF2-40B4-BE49-F238E27FC236}">
+                <a16:creationId xmlns:a16="http://schemas.microsoft.com/office/drawing/2014/main" id="{DBFBC5BD-EDDC-894E-8FB9-2D4A903CA481}"/>
+              </a:ext>
+            </a:extLst>
+          </p:cNvPr>
+          <p:cNvSpPr/>
+          <p:nvPr/>
+        </p:nvSpPr>
+        <p:spPr>
+          <a:xfrm>
+            <a:off x="1762912" y="3645243"/>
+            <a:ext cx="1400420" cy="1668162"/>
+          </a:xfrm>
+          <a:prstGeom prst="rect">
+            <a:avLst/>
+          </a:prstGeom>
+        </p:spPr>
+        <p:style>
+          <a:lnRef idx="2">
+            <a:schemeClr val="accent6"/>
+          </a:lnRef>
+          <a:fillRef idx="1">
+            <a:schemeClr val="lt1"/>
+          </a:fillRef>
+          <a:effectRef idx="0">
+            <a:schemeClr val="accent6"/>
+          </a:effectRef>
+          <a:fontRef idx="minor">
+            <a:schemeClr val="dk1"/>
+          </a:fontRef>
+        </p:style>
+        <p:txBody>
+          <a:bodyPr rtlCol="0" anchor="ctr"/>
+          <a:lstStyle/>
+          <a:p>
+            <a:pPr algn="ctr"/>
+            <a:r>
+              <a:rPr lang="en-US" sz="1200" dirty="0" err="1"/>
+              <a:t>ToxiproxyClient</a:t>
+            </a:r>
+            <a:endParaRPr lang="en-US" sz="1200" dirty="0"/>
+          </a:p>
+        </p:txBody>
+      </p:sp>
+      <p:sp>
+        <p:nvSpPr>
+          <p:cNvPr id="8" name="Rectangle 7">
+            <a:extLst>
+              <a:ext uri="{FF2B5EF4-FFF2-40B4-BE49-F238E27FC236}">
+                <a16:creationId xmlns:a16="http://schemas.microsoft.com/office/drawing/2014/main" id="{2E19B658-005E-2745-B4A2-64E8370868A2}"/>
+              </a:ext>
+            </a:extLst>
+          </p:cNvPr>
+          <p:cNvSpPr/>
+          <p:nvPr/>
+        </p:nvSpPr>
+        <p:spPr>
+          <a:xfrm>
+            <a:off x="3822364" y="3645244"/>
+            <a:ext cx="1400420" cy="531340"/>
+          </a:xfrm>
+          <a:prstGeom prst="rect">
+            <a:avLst/>
+          </a:prstGeom>
+        </p:spPr>
+        <p:style>
+          <a:lnRef idx="2">
+            <a:schemeClr val="accent6"/>
+          </a:lnRef>
+          <a:fillRef idx="1">
+            <a:schemeClr val="lt1"/>
+          </a:fillRef>
+          <a:effectRef idx="0">
+            <a:schemeClr val="accent6"/>
+          </a:effectRef>
+          <a:fontRef idx="minor">
+            <a:schemeClr val="dk1"/>
+          </a:fontRef>
+        </p:style>
+        <p:txBody>
+          <a:bodyPr rtlCol="0" anchor="ctr"/>
+          <a:lstStyle/>
+          <a:p>
+            <a:pPr algn="ctr"/>
+            <a:r>
+              <a:rPr lang="en-US" sz="1200" dirty="0" err="1"/>
+              <a:t>ProxyHelper.Add</a:t>
+            </a:r>
+            <a:r>
+              <a:rPr lang="en-US" sz="1200" dirty="0"/>
+              <a:t>()</a:t>
+            </a:r>
+          </a:p>
+        </p:txBody>
+      </p:sp>
+      <p:sp>
+        <p:nvSpPr>
+          <p:cNvPr id="9" name="Rectangle 8">
+            <a:extLst>
+              <a:ext uri="{FF2B5EF4-FFF2-40B4-BE49-F238E27FC236}">
+                <a16:creationId xmlns:a16="http://schemas.microsoft.com/office/drawing/2014/main" id="{F9A516B9-4668-5646-9E0F-723FCC6FA613}"/>
+              </a:ext>
+            </a:extLst>
+          </p:cNvPr>
+          <p:cNvSpPr/>
+          <p:nvPr/>
+        </p:nvSpPr>
+        <p:spPr>
+          <a:xfrm>
+            <a:off x="3822364" y="4275441"/>
+            <a:ext cx="1400420" cy="531340"/>
+          </a:xfrm>
+          <a:prstGeom prst="rect">
+            <a:avLst/>
+          </a:prstGeom>
+        </p:spPr>
+        <p:style>
+          <a:lnRef idx="2">
+            <a:schemeClr val="accent6"/>
+          </a:lnRef>
+          <a:fillRef idx="1">
+            <a:schemeClr val="lt1"/>
+          </a:fillRef>
+          <a:effectRef idx="0">
+            <a:schemeClr val="accent6"/>
+          </a:effectRef>
+          <a:fontRef idx="minor">
+            <a:schemeClr val="dk1"/>
+          </a:fontRef>
+        </p:style>
+        <p:txBody>
+          <a:bodyPr rtlCol="0" anchor="ctr"/>
+          <a:lstStyle/>
+          <a:p>
+            <a:pPr algn="ctr"/>
+            <a:r>
+              <a:rPr lang="en-US" sz="1200" dirty="0" err="1"/>
+              <a:t>ToxicHelper.Add</a:t>
+            </a:r>
+            <a:r>
+              <a:rPr lang="en-US" sz="1200" dirty="0"/>
+              <a:t>()</a:t>
+            </a:r>
+          </a:p>
+        </p:txBody>
+      </p:sp>
+      <p:sp>
+        <p:nvSpPr>
+          <p:cNvPr id="10" name="TextBox 9">
+            <a:extLst>
+              <a:ext uri="{FF2B5EF4-FFF2-40B4-BE49-F238E27FC236}">
+                <a16:creationId xmlns:a16="http://schemas.microsoft.com/office/drawing/2014/main" id="{0A3249E5-1C20-5043-8C6B-9576233FCE66}"/>
+              </a:ext>
+            </a:extLst>
+          </p:cNvPr>
+          <p:cNvSpPr txBox="1"/>
+          <p:nvPr/>
+        </p:nvSpPr>
+        <p:spPr>
+          <a:xfrm>
+            <a:off x="2499787" y="5036406"/>
+            <a:ext cx="662041" cy="276999"/>
+          </a:xfrm>
+          <a:prstGeom prst="rect">
+            <a:avLst/>
+          </a:prstGeom>
+          <a:noFill/>
+        </p:spPr>
+        <p:txBody>
+          <a:bodyPr wrap="none" rtlCol="0">
+            <a:spAutoFit/>
+          </a:bodyPr>
+          <a:lstStyle/>
+          <a:p>
+            <a:r>
+              <a:rPr lang="en-US" sz="1200" dirty="0"/>
+              <a:t>.Reset()</a:t>
+            </a:r>
+          </a:p>
+        </p:txBody>
+      </p:sp>
+      <p:sp>
+        <p:nvSpPr>
+          <p:cNvPr id="11" name="Diamond 10">
+            <a:extLst>
+              <a:ext uri="{FF2B5EF4-FFF2-40B4-BE49-F238E27FC236}">
+                <a16:creationId xmlns:a16="http://schemas.microsoft.com/office/drawing/2014/main" id="{30185FA1-2E8F-7145-BC3E-FE0F65453481}"/>
+              </a:ext>
+            </a:extLst>
+          </p:cNvPr>
+          <p:cNvSpPr/>
+          <p:nvPr/>
+        </p:nvSpPr>
+        <p:spPr>
+          <a:xfrm>
+            <a:off x="6470833" y="3729937"/>
+            <a:ext cx="1495168" cy="1498773"/>
+          </a:xfrm>
+          <a:prstGeom prst="diamond">
+            <a:avLst/>
+          </a:prstGeom>
+        </p:spPr>
+        <p:style>
+          <a:lnRef idx="2">
+            <a:schemeClr val="accent6"/>
+          </a:lnRef>
+          <a:fillRef idx="1">
+            <a:schemeClr val="lt1"/>
+          </a:fillRef>
+          <a:effectRef idx="0">
+            <a:schemeClr val="accent6"/>
+          </a:effectRef>
+          <a:fontRef idx="minor">
+            <a:schemeClr val="dk1"/>
+          </a:fontRef>
+        </p:style>
+        <p:txBody>
+          <a:bodyPr rtlCol="0" anchor="ctr"/>
+          <a:lstStyle/>
+          <a:p>
+            <a:pPr algn="ctr"/>
+            <a:r>
+              <a:rPr lang="en-US" sz="1400" dirty="0" err="1"/>
+              <a:t>Toxi</a:t>
+            </a:r>
+            <a:endParaRPr lang="en-US" sz="1400" dirty="0"/>
+          </a:p>
+          <a:p>
+            <a:pPr algn="ctr"/>
+            <a:r>
+              <a:rPr lang="en-US" sz="1400" dirty="0"/>
+              <a:t>Proxy</a:t>
+            </a:r>
+          </a:p>
+        </p:txBody>
+      </p:sp>
+      <p:cxnSp>
+        <p:nvCxnSpPr>
+          <p:cNvPr id="13" name="Straight Arrow Connector 12">
+            <a:extLst>
+              <a:ext uri="{FF2B5EF4-FFF2-40B4-BE49-F238E27FC236}">
+                <a16:creationId xmlns:a16="http://schemas.microsoft.com/office/drawing/2014/main" id="{75DDF2D6-1879-0B41-8344-ED3295FF5FDD}"/>
+              </a:ext>
+            </a:extLst>
+          </p:cNvPr>
+          <p:cNvCxnSpPr/>
+          <p:nvPr/>
+        </p:nvCxnSpPr>
+        <p:spPr>
+          <a:xfrm>
+            <a:off x="2499787" y="2499153"/>
+            <a:ext cx="0" cy="1146090"/>
+          </a:xfrm>
+          <a:prstGeom prst="straightConnector1">
+            <a:avLst/>
+          </a:prstGeom>
+          <a:ln>
+            <a:tailEnd type="triangle"/>
+          </a:ln>
+        </p:spPr>
+        <p:style>
+          <a:lnRef idx="1">
+            <a:schemeClr val="accent1"/>
+          </a:lnRef>
+          <a:fillRef idx="0">
+            <a:schemeClr val="accent1"/>
+          </a:fillRef>
+          <a:effectRef idx="0">
+            <a:schemeClr val="accent1"/>
+          </a:effectRef>
+          <a:fontRef idx="minor">
+            <a:schemeClr val="tx1"/>
+          </a:fontRef>
+        </p:style>
+      </p:cxnSp>
+      <p:cxnSp>
+        <p:nvCxnSpPr>
+          <p:cNvPr id="15" name="Straight Arrow Connector 14">
+            <a:extLst>
+              <a:ext uri="{FF2B5EF4-FFF2-40B4-BE49-F238E27FC236}">
+                <a16:creationId xmlns:a16="http://schemas.microsoft.com/office/drawing/2014/main" id="{1DF3876A-0BB3-A24B-8C15-F49020910106}"/>
+              </a:ext>
+            </a:extLst>
+          </p:cNvPr>
+          <p:cNvCxnSpPr/>
+          <p:nvPr/>
+        </p:nvCxnSpPr>
+        <p:spPr>
+          <a:xfrm>
+            <a:off x="3161828" y="3849129"/>
+            <a:ext cx="660536" cy="0"/>
+          </a:xfrm>
+          <a:prstGeom prst="straightConnector1">
+            <a:avLst/>
+          </a:prstGeom>
+          <a:ln>
+            <a:tailEnd type="triangle"/>
+          </a:ln>
+        </p:spPr>
+        <p:style>
+          <a:lnRef idx="1">
+            <a:schemeClr val="accent1"/>
+          </a:lnRef>
+          <a:fillRef idx="0">
+            <a:schemeClr val="accent1"/>
+          </a:fillRef>
+          <a:effectRef idx="0">
+            <a:schemeClr val="accent1"/>
+          </a:effectRef>
+          <a:fontRef idx="minor">
+            <a:schemeClr val="tx1"/>
+          </a:fontRef>
+        </p:style>
+      </p:cxnSp>
+      <p:cxnSp>
+        <p:nvCxnSpPr>
+          <p:cNvPr id="17" name="Straight Arrow Connector 16">
+            <a:extLst>
+              <a:ext uri="{FF2B5EF4-FFF2-40B4-BE49-F238E27FC236}">
+                <a16:creationId xmlns:a16="http://schemas.microsoft.com/office/drawing/2014/main" id="{DC0F1BF1-E3D1-4C4C-BE3B-7AB381007FAF}"/>
+              </a:ext>
+            </a:extLst>
+          </p:cNvPr>
+          <p:cNvCxnSpPr/>
+          <p:nvPr/>
+        </p:nvCxnSpPr>
+        <p:spPr>
+          <a:xfrm>
+            <a:off x="3161828" y="4534929"/>
+            <a:ext cx="660536" cy="0"/>
+          </a:xfrm>
+          <a:prstGeom prst="straightConnector1">
+            <a:avLst/>
+          </a:prstGeom>
+          <a:ln>
+            <a:tailEnd type="triangle"/>
+          </a:ln>
+        </p:spPr>
+        <p:style>
+          <a:lnRef idx="1">
+            <a:schemeClr val="accent1"/>
+          </a:lnRef>
+          <a:fillRef idx="0">
+            <a:schemeClr val="accent1"/>
+          </a:fillRef>
+          <a:effectRef idx="0">
+            <a:schemeClr val="accent1"/>
+          </a:effectRef>
+          <a:fontRef idx="minor">
+            <a:schemeClr val="tx1"/>
+          </a:fontRef>
+        </p:style>
+      </p:cxnSp>
+      <p:sp>
+        <p:nvSpPr>
+          <p:cNvPr id="18" name="Rectangle 17">
+            <a:extLst>
+              <a:ext uri="{FF2B5EF4-FFF2-40B4-BE49-F238E27FC236}">
+                <a16:creationId xmlns:a16="http://schemas.microsoft.com/office/drawing/2014/main" id="{3E2F3495-A044-1347-AFBA-9CDA1102FF6A}"/>
+              </a:ext>
+            </a:extLst>
+          </p:cNvPr>
+          <p:cNvSpPr/>
+          <p:nvPr/>
+        </p:nvSpPr>
+        <p:spPr>
+          <a:xfrm>
+            <a:off x="8270806" y="3605850"/>
+            <a:ext cx="2170659" cy="2286000"/>
+          </a:xfrm>
+          <a:prstGeom prst="rect">
+            <a:avLst/>
+          </a:prstGeom>
+          <a:ln>
+            <a:prstDash val="dash"/>
+          </a:ln>
+        </p:spPr>
+        <p:style>
+          <a:lnRef idx="2">
+            <a:schemeClr val="accent6"/>
+          </a:lnRef>
+          <a:fillRef idx="1">
+            <a:schemeClr val="lt1"/>
+          </a:fillRef>
+          <a:effectRef idx="0">
+            <a:schemeClr val="accent6"/>
+          </a:effectRef>
+          <a:fontRef idx="minor">
+            <a:schemeClr val="dk1"/>
+          </a:fontRef>
+        </p:style>
+        <p:txBody>
+          <a:bodyPr rtlCol="0" anchor="b" anchorCtr="1"/>
+          <a:lstStyle/>
+          <a:p>
+            <a:pPr algn="ctr"/>
+            <a:r>
+              <a:rPr lang="en-US" sz="1200" dirty="0" err="1"/>
+              <a:t>ToxiproxyDotNetCore.Test.Api</a:t>
+            </a:r>
+            <a:endParaRPr lang="en-US" sz="1200" dirty="0"/>
+          </a:p>
+        </p:txBody>
+      </p:sp>
+      <p:sp>
+        <p:nvSpPr>
+          <p:cNvPr id="19" name="Oval 18">
+            <a:extLst>
+              <a:ext uri="{FF2B5EF4-FFF2-40B4-BE49-F238E27FC236}">
+                <a16:creationId xmlns:a16="http://schemas.microsoft.com/office/drawing/2014/main" id="{2B97A558-65CA-554A-9513-67F2DB1DBAF1}"/>
+              </a:ext>
+            </a:extLst>
+          </p:cNvPr>
+          <p:cNvSpPr/>
+          <p:nvPr/>
+        </p:nvSpPr>
+        <p:spPr>
+          <a:xfrm>
+            <a:off x="8690931" y="3849129"/>
+            <a:ext cx="1330414" cy="1283815"/>
+          </a:xfrm>
+          <a:prstGeom prst="ellipse">
+            <a:avLst/>
+          </a:prstGeom>
+        </p:spPr>
+        <p:style>
+          <a:lnRef idx="2">
+            <a:schemeClr val="accent6"/>
+          </a:lnRef>
+          <a:fillRef idx="1">
+            <a:schemeClr val="lt1"/>
+          </a:fillRef>
+          <a:effectRef idx="0">
+            <a:schemeClr val="accent6"/>
+          </a:effectRef>
+          <a:fontRef idx="minor">
+            <a:schemeClr val="dk1"/>
+          </a:fontRef>
+        </p:style>
+        <p:txBody>
+          <a:bodyPr rtlCol="0" anchor="ctr"/>
+          <a:lstStyle/>
+          <a:p>
+            <a:pPr algn="ctr"/>
+            <a:r>
+              <a:rPr lang="en-US" sz="1200" dirty="0"/>
+              <a:t>localhost:</a:t>
+            </a:r>
+          </a:p>
+          <a:p>
+            <a:pPr algn="ctr"/>
+            <a:r>
+              <a:rPr lang="en-US" sz="1200" dirty="0"/>
+              <a:t>5001</a:t>
+            </a:r>
+          </a:p>
+        </p:txBody>
+      </p:sp>
+      <p:cxnSp>
+        <p:nvCxnSpPr>
+          <p:cNvPr id="20" name="Straight Arrow Connector 19">
+            <a:extLst>
+              <a:ext uri="{FF2B5EF4-FFF2-40B4-BE49-F238E27FC236}">
+                <a16:creationId xmlns:a16="http://schemas.microsoft.com/office/drawing/2014/main" id="{4FD6DFF1-D225-6B4E-A781-6ABA6DC3D9CD}"/>
+              </a:ext>
+            </a:extLst>
+          </p:cNvPr>
+          <p:cNvCxnSpPr>
+            <a:endCxn id="19" idx="2"/>
+          </p:cNvCxnSpPr>
+          <p:nvPr/>
+        </p:nvCxnSpPr>
+        <p:spPr>
+          <a:xfrm>
+            <a:off x="7953644" y="4487303"/>
+            <a:ext cx="737287" cy="3734"/>
+          </a:xfrm>
+          <a:prstGeom prst="straightConnector1">
+            <a:avLst/>
+          </a:prstGeom>
+          <a:ln>
+            <a:tailEnd type="triangle"/>
+          </a:ln>
+        </p:spPr>
+        <p:style>
+          <a:lnRef idx="1">
+            <a:schemeClr val="accent6"/>
+          </a:lnRef>
+          <a:fillRef idx="0">
+            <a:schemeClr val="accent6"/>
+          </a:fillRef>
+          <a:effectRef idx="0">
+            <a:schemeClr val="accent6"/>
+          </a:effectRef>
+          <a:fontRef idx="minor">
+            <a:schemeClr val="tx1"/>
+          </a:fontRef>
+        </p:style>
+      </p:cxnSp>
+      <p:sp>
+        <p:nvSpPr>
+          <p:cNvPr id="21" name="Double Brace 20">
+            <a:extLst>
+              <a:ext uri="{FF2B5EF4-FFF2-40B4-BE49-F238E27FC236}">
+                <a16:creationId xmlns:a16="http://schemas.microsoft.com/office/drawing/2014/main" id="{91D23F17-BF67-2841-BAD8-B6EBA4EB3F76}"/>
+              </a:ext>
+            </a:extLst>
+          </p:cNvPr>
+          <p:cNvSpPr/>
+          <p:nvPr/>
+        </p:nvSpPr>
+        <p:spPr>
+          <a:xfrm>
+            <a:off x="7831324" y="5014267"/>
+            <a:ext cx="766128" cy="444843"/>
+          </a:xfrm>
+          <a:prstGeom prst="bracePair">
+            <a:avLst/>
+          </a:prstGeom>
+        </p:spPr>
+        <p:style>
+          <a:lnRef idx="1">
+            <a:schemeClr val="accent1"/>
+          </a:lnRef>
+          <a:fillRef idx="0">
+            <a:schemeClr val="accent1"/>
+          </a:fillRef>
+          <a:effectRef idx="0">
+            <a:schemeClr val="accent1"/>
+          </a:effectRef>
+          <a:fontRef idx="minor">
+            <a:schemeClr val="tx1"/>
+          </a:fontRef>
+        </p:style>
+        <p:txBody>
+          <a:bodyPr rtlCol="0" anchor="ctr"/>
+          <a:lstStyle/>
+          <a:p>
+            <a:pPr algn="ctr"/>
+            <a:r>
+              <a:rPr lang="en-US" sz="1000" dirty="0" err="1"/>
+              <a:t>PostmanEcho</a:t>
+            </a:r>
+            <a:endParaRPr lang="en-US" sz="1000" dirty="0"/>
+          </a:p>
+        </p:txBody>
+      </p:sp>
+      <p:cxnSp>
+        <p:nvCxnSpPr>
+          <p:cNvPr id="22" name="Straight Arrow Connector 21">
+            <a:extLst>
+              <a:ext uri="{FF2B5EF4-FFF2-40B4-BE49-F238E27FC236}">
+                <a16:creationId xmlns:a16="http://schemas.microsoft.com/office/drawing/2014/main" id="{9B8FF1B9-85E2-7849-BBDF-988A54D8406B}"/>
+              </a:ext>
+            </a:extLst>
+          </p:cNvPr>
+          <p:cNvCxnSpPr>
+            <a:cxnSpLocks/>
+          </p:cNvCxnSpPr>
+          <p:nvPr/>
+        </p:nvCxnSpPr>
+        <p:spPr>
+          <a:xfrm flipH="1">
+            <a:off x="7613018" y="4857235"/>
+            <a:ext cx="1162792" cy="0"/>
+          </a:xfrm>
+          <a:prstGeom prst="straightConnector1">
+            <a:avLst/>
+          </a:prstGeom>
+          <a:ln>
+            <a:tailEnd type="triangle"/>
+          </a:ln>
+        </p:spPr>
+        <p:style>
+          <a:lnRef idx="1">
+            <a:schemeClr val="accent6"/>
+          </a:lnRef>
+          <a:fillRef idx="0">
+            <a:schemeClr val="accent6"/>
+          </a:fillRef>
+          <a:effectRef idx="0">
+            <a:schemeClr val="accent6"/>
+          </a:effectRef>
+          <a:fontRef idx="minor">
+            <a:schemeClr val="tx1"/>
+          </a:fontRef>
+        </p:style>
+      </p:cxnSp>
+      <p:cxnSp>
+        <p:nvCxnSpPr>
+          <p:cNvPr id="24" name="Straight Arrow Connector 23">
+            <a:extLst>
+              <a:ext uri="{FF2B5EF4-FFF2-40B4-BE49-F238E27FC236}">
+                <a16:creationId xmlns:a16="http://schemas.microsoft.com/office/drawing/2014/main" id="{99C8FEB9-9813-1346-B738-2210F615E725}"/>
+              </a:ext>
+            </a:extLst>
+          </p:cNvPr>
+          <p:cNvCxnSpPr/>
+          <p:nvPr/>
+        </p:nvCxnSpPr>
+        <p:spPr>
+          <a:xfrm>
+            <a:off x="5222784" y="3849129"/>
+            <a:ext cx="1775260" cy="0"/>
+          </a:xfrm>
+          <a:prstGeom prst="straightConnector1">
+            <a:avLst/>
+          </a:prstGeom>
+          <a:ln>
+            <a:tailEnd type="triangle"/>
+          </a:ln>
+        </p:spPr>
+        <p:style>
+          <a:lnRef idx="1">
+            <a:schemeClr val="accent1"/>
+          </a:lnRef>
+          <a:fillRef idx="0">
+            <a:schemeClr val="accent1"/>
+          </a:fillRef>
+          <a:effectRef idx="0">
+            <a:schemeClr val="accent1"/>
+          </a:effectRef>
+          <a:fontRef idx="minor">
+            <a:schemeClr val="tx1"/>
+          </a:fontRef>
+        </p:style>
+      </p:cxnSp>
+      <p:cxnSp>
+        <p:nvCxnSpPr>
+          <p:cNvPr id="26" name="Straight Arrow Connector 25">
+            <a:extLst>
+              <a:ext uri="{FF2B5EF4-FFF2-40B4-BE49-F238E27FC236}">
+                <a16:creationId xmlns:a16="http://schemas.microsoft.com/office/drawing/2014/main" id="{667C1BDC-8A1C-184E-949E-A4B6DABBC799}"/>
+              </a:ext>
+            </a:extLst>
+          </p:cNvPr>
+          <p:cNvCxnSpPr/>
+          <p:nvPr/>
+        </p:nvCxnSpPr>
+        <p:spPr>
+          <a:xfrm>
+            <a:off x="5222784" y="4534929"/>
+            <a:ext cx="1248049" cy="0"/>
+          </a:xfrm>
+          <a:prstGeom prst="straightConnector1">
+            <a:avLst/>
+          </a:prstGeom>
+          <a:ln>
+            <a:tailEnd type="triangle"/>
+          </a:ln>
+        </p:spPr>
+        <p:style>
+          <a:lnRef idx="1">
+            <a:schemeClr val="accent1"/>
+          </a:lnRef>
+          <a:fillRef idx="0">
+            <a:schemeClr val="accent1"/>
+          </a:fillRef>
+          <a:effectRef idx="0">
+            <a:schemeClr val="accent1"/>
+          </a:effectRef>
+          <a:fontRef idx="minor">
+            <a:schemeClr val="tx1"/>
+          </a:fontRef>
+        </p:style>
+      </p:cxnSp>
+      <p:cxnSp>
+        <p:nvCxnSpPr>
+          <p:cNvPr id="28" name="Straight Arrow Connector 27">
+            <a:extLst>
+              <a:ext uri="{FF2B5EF4-FFF2-40B4-BE49-F238E27FC236}">
+                <a16:creationId xmlns:a16="http://schemas.microsoft.com/office/drawing/2014/main" id="{3388F2EB-2C61-0840-B270-4B22FCBE872A}"/>
+              </a:ext>
+            </a:extLst>
+          </p:cNvPr>
+          <p:cNvCxnSpPr/>
+          <p:nvPr/>
+        </p:nvCxnSpPr>
+        <p:spPr>
+          <a:xfrm>
+            <a:off x="3161828" y="5203996"/>
+            <a:ext cx="3955665" cy="0"/>
+          </a:xfrm>
+          <a:prstGeom prst="straightConnector1">
+            <a:avLst/>
+          </a:prstGeom>
+          <a:ln>
+            <a:tailEnd type="triangle"/>
+          </a:ln>
+        </p:spPr>
+        <p:style>
+          <a:lnRef idx="1">
+            <a:schemeClr val="accent1"/>
+          </a:lnRef>
+          <a:fillRef idx="0">
+            <a:schemeClr val="accent1"/>
+          </a:fillRef>
+          <a:effectRef idx="0">
+            <a:schemeClr val="accent1"/>
+          </a:effectRef>
+          <a:fontRef idx="minor">
+            <a:schemeClr val="tx1"/>
+          </a:fontRef>
+        </p:style>
+      </p:cxnSp>
+      <p:cxnSp>
+        <p:nvCxnSpPr>
+          <p:cNvPr id="30" name="Elbow Connector 29">
+            <a:extLst>
+              <a:ext uri="{FF2B5EF4-FFF2-40B4-BE49-F238E27FC236}">
+                <a16:creationId xmlns:a16="http://schemas.microsoft.com/office/drawing/2014/main" id="{6DAE756D-A2C7-0F4B-BD66-44294F712DC5}"/>
+              </a:ext>
+            </a:extLst>
+          </p:cNvPr>
+          <p:cNvCxnSpPr>
+            <a:cxnSpLocks/>
+            <a:endCxn id="11" idx="0"/>
+          </p:cNvCxnSpPr>
+          <p:nvPr/>
+        </p:nvCxnSpPr>
+        <p:spPr>
+          <a:xfrm>
+            <a:off x="4754260" y="1952367"/>
+            <a:ext cx="2464157" cy="1777570"/>
+          </a:xfrm>
+          <a:prstGeom prst="bentConnector2">
+            <a:avLst/>
+          </a:prstGeom>
+          <a:ln>
+            <a:headEnd type="triangle"/>
+            <a:tailEnd type="triangle"/>
+          </a:ln>
+        </p:spPr>
+        <p:style>
+          <a:lnRef idx="1">
+            <a:schemeClr val="accent1"/>
+          </a:lnRef>
+          <a:fillRef idx="0">
+            <a:schemeClr val="accent1"/>
+          </a:fillRef>
+          <a:effectRef idx="0">
+            <a:schemeClr val="accent1"/>
+          </a:effectRef>
+          <a:fontRef idx="minor">
+            <a:schemeClr val="tx1"/>
+          </a:fontRef>
+        </p:style>
+      </p:cxnSp>
+      <p:sp>
+        <p:nvSpPr>
+          <p:cNvPr id="32" name="Oval 31">
+            <a:extLst>
+              <a:ext uri="{FF2B5EF4-FFF2-40B4-BE49-F238E27FC236}">
+                <a16:creationId xmlns:a16="http://schemas.microsoft.com/office/drawing/2014/main" id="{03D481F1-1F8B-9B43-A360-EB73BEAED6E1}"/>
+              </a:ext>
+            </a:extLst>
+          </p:cNvPr>
+          <p:cNvSpPr/>
+          <p:nvPr/>
+        </p:nvSpPr>
+        <p:spPr>
+          <a:xfrm>
+            <a:off x="2546934" y="2953263"/>
+            <a:ext cx="326646" cy="308919"/>
+          </a:xfrm>
+          <a:prstGeom prst="ellipse">
+            <a:avLst/>
+          </a:prstGeom>
+        </p:spPr>
+        <p:style>
+          <a:lnRef idx="2">
+            <a:schemeClr val="accent6"/>
+          </a:lnRef>
+          <a:fillRef idx="1">
+            <a:schemeClr val="lt1"/>
+          </a:fillRef>
+          <a:effectRef idx="0">
+            <a:schemeClr val="accent6"/>
+          </a:effectRef>
+          <a:fontRef idx="minor">
+            <a:schemeClr val="dk1"/>
+          </a:fontRef>
+        </p:style>
+        <p:txBody>
+          <a:bodyPr rtlCol="0" anchor="ctr"/>
+          <a:lstStyle/>
+          <a:p>
+            <a:pPr algn="ctr"/>
+            <a:r>
+              <a:rPr lang="en-US" dirty="0"/>
+              <a:t>1</a:t>
+            </a:r>
+          </a:p>
+        </p:txBody>
+      </p:sp>
+      <p:sp>
+        <p:nvSpPr>
+          <p:cNvPr id="33" name="Oval 32">
+            <a:extLst>
+              <a:ext uri="{FF2B5EF4-FFF2-40B4-BE49-F238E27FC236}">
+                <a16:creationId xmlns:a16="http://schemas.microsoft.com/office/drawing/2014/main" id="{14C2FBFF-CC80-C04C-93FB-DD6829EB49A8}"/>
+              </a:ext>
+            </a:extLst>
+          </p:cNvPr>
+          <p:cNvSpPr/>
+          <p:nvPr/>
+        </p:nvSpPr>
+        <p:spPr>
+          <a:xfrm>
+            <a:off x="3313659" y="3506229"/>
+            <a:ext cx="326646" cy="308919"/>
+          </a:xfrm>
+          <a:prstGeom prst="ellipse">
+            <a:avLst/>
+          </a:prstGeom>
+        </p:spPr>
+        <p:style>
+          <a:lnRef idx="2">
+            <a:schemeClr val="accent6"/>
+          </a:lnRef>
+          <a:fillRef idx="1">
+            <a:schemeClr val="lt1"/>
+          </a:fillRef>
+          <a:effectRef idx="0">
+            <a:schemeClr val="accent6"/>
+          </a:effectRef>
+          <a:fontRef idx="minor">
+            <a:schemeClr val="dk1"/>
+          </a:fontRef>
+        </p:style>
+        <p:txBody>
+          <a:bodyPr rtlCol="0" anchor="ctr"/>
+          <a:lstStyle/>
+          <a:p>
+            <a:pPr algn="ctr"/>
+            <a:r>
+              <a:rPr lang="en-US" dirty="0"/>
+              <a:t>2</a:t>
+            </a:r>
+          </a:p>
+        </p:txBody>
+      </p:sp>
+      <p:sp>
+        <p:nvSpPr>
+          <p:cNvPr id="34" name="Oval 33">
+            <a:extLst>
+              <a:ext uri="{FF2B5EF4-FFF2-40B4-BE49-F238E27FC236}">
+                <a16:creationId xmlns:a16="http://schemas.microsoft.com/office/drawing/2014/main" id="{C1CB8C13-F98B-F44B-A439-BB8C69551077}"/>
+              </a:ext>
+            </a:extLst>
+          </p:cNvPr>
+          <p:cNvSpPr/>
+          <p:nvPr/>
+        </p:nvSpPr>
+        <p:spPr>
+          <a:xfrm>
+            <a:off x="3329525" y="4181862"/>
+            <a:ext cx="326646" cy="308919"/>
+          </a:xfrm>
+          <a:prstGeom prst="ellipse">
+            <a:avLst/>
+          </a:prstGeom>
+        </p:spPr>
+        <p:style>
+          <a:lnRef idx="2">
+            <a:schemeClr val="accent6"/>
+          </a:lnRef>
+          <a:fillRef idx="1">
+            <a:schemeClr val="lt1"/>
+          </a:fillRef>
+          <a:effectRef idx="0">
+            <a:schemeClr val="accent6"/>
+          </a:effectRef>
+          <a:fontRef idx="minor">
+            <a:schemeClr val="dk1"/>
+          </a:fontRef>
+        </p:style>
+        <p:txBody>
+          <a:bodyPr rtlCol="0" anchor="ctr"/>
+          <a:lstStyle/>
+          <a:p>
+            <a:pPr algn="ctr"/>
+            <a:r>
+              <a:rPr lang="en-US" dirty="0"/>
+              <a:t>3</a:t>
+            </a:r>
+          </a:p>
+        </p:txBody>
+      </p:sp>
+      <p:sp>
+        <p:nvSpPr>
+          <p:cNvPr id="35" name="Oval 34">
+            <a:extLst>
+              <a:ext uri="{FF2B5EF4-FFF2-40B4-BE49-F238E27FC236}">
+                <a16:creationId xmlns:a16="http://schemas.microsoft.com/office/drawing/2014/main" id="{7D71ED1E-4A3E-3848-8744-70B958B82E48}"/>
+              </a:ext>
+            </a:extLst>
+          </p:cNvPr>
+          <p:cNvSpPr/>
+          <p:nvPr/>
+        </p:nvSpPr>
+        <p:spPr>
+          <a:xfrm>
+            <a:off x="3329525" y="4849126"/>
+            <a:ext cx="326646" cy="308919"/>
+          </a:xfrm>
+          <a:prstGeom prst="ellipse">
+            <a:avLst/>
+          </a:prstGeom>
+        </p:spPr>
+        <p:style>
+          <a:lnRef idx="2">
+            <a:schemeClr val="accent6"/>
+          </a:lnRef>
+          <a:fillRef idx="1">
+            <a:schemeClr val="lt1"/>
+          </a:fillRef>
+          <a:effectRef idx="0">
+            <a:schemeClr val="accent6"/>
+          </a:effectRef>
+          <a:fontRef idx="minor">
+            <a:schemeClr val="dk1"/>
+          </a:fontRef>
+        </p:style>
+        <p:txBody>
+          <a:bodyPr rtlCol="0" anchor="ctr"/>
+          <a:lstStyle/>
+          <a:p>
+            <a:pPr algn="ctr"/>
+            <a:r>
+              <a:rPr lang="en-US" dirty="0"/>
+              <a:t>6</a:t>
+            </a:r>
+          </a:p>
+        </p:txBody>
+      </p:sp>
+      <p:sp>
+        <p:nvSpPr>
+          <p:cNvPr id="36" name="Oval 35">
+            <a:extLst>
+              <a:ext uri="{FF2B5EF4-FFF2-40B4-BE49-F238E27FC236}">
+                <a16:creationId xmlns:a16="http://schemas.microsoft.com/office/drawing/2014/main" id="{86AA1D37-694D-C945-8959-FD0E1D302904}"/>
+              </a:ext>
+            </a:extLst>
+          </p:cNvPr>
+          <p:cNvSpPr/>
+          <p:nvPr/>
+        </p:nvSpPr>
+        <p:spPr>
+          <a:xfrm>
+            <a:off x="4976337" y="1545371"/>
+            <a:ext cx="326646" cy="308919"/>
+          </a:xfrm>
+          <a:prstGeom prst="ellipse">
+            <a:avLst/>
+          </a:prstGeom>
+        </p:spPr>
+        <p:style>
+          <a:lnRef idx="2">
+            <a:schemeClr val="accent6"/>
+          </a:lnRef>
+          <a:fillRef idx="1">
+            <a:schemeClr val="lt1"/>
+          </a:fillRef>
+          <a:effectRef idx="0">
+            <a:schemeClr val="accent6"/>
+          </a:effectRef>
+          <a:fontRef idx="minor">
+            <a:schemeClr val="dk1"/>
+          </a:fontRef>
+        </p:style>
+        <p:txBody>
+          <a:bodyPr rtlCol="0" anchor="ctr"/>
+          <a:lstStyle/>
+          <a:p>
+            <a:pPr algn="ctr"/>
+            <a:r>
+              <a:rPr lang="en-US" dirty="0"/>
+              <a:t>4</a:t>
+            </a:r>
+          </a:p>
+        </p:txBody>
+      </p:sp>
+      <p:sp>
+        <p:nvSpPr>
+          <p:cNvPr id="37" name="Oval 36">
+            <a:extLst>
+              <a:ext uri="{FF2B5EF4-FFF2-40B4-BE49-F238E27FC236}">
+                <a16:creationId xmlns:a16="http://schemas.microsoft.com/office/drawing/2014/main" id="{477A331F-C4AB-A24D-9BA2-6B720069B104}"/>
+              </a:ext>
+            </a:extLst>
+          </p:cNvPr>
+          <p:cNvSpPr/>
+          <p:nvPr/>
+        </p:nvSpPr>
+        <p:spPr>
+          <a:xfrm>
+            <a:off x="8086881" y="4099868"/>
+            <a:ext cx="326646" cy="308919"/>
+          </a:xfrm>
+          <a:prstGeom prst="ellipse">
+            <a:avLst/>
+          </a:prstGeom>
+        </p:spPr>
+        <p:style>
+          <a:lnRef idx="2">
+            <a:schemeClr val="accent6"/>
+          </a:lnRef>
+          <a:fillRef idx="1">
+            <a:schemeClr val="lt1"/>
+          </a:fillRef>
+          <a:effectRef idx="0">
+            <a:schemeClr val="accent6"/>
+          </a:effectRef>
+          <a:fontRef idx="minor">
+            <a:schemeClr val="dk1"/>
+          </a:fontRef>
+        </p:style>
+        <p:txBody>
+          <a:bodyPr rtlCol="0" anchor="ctr"/>
+          <a:lstStyle/>
+          <a:p>
+            <a:pPr algn="ctr"/>
+            <a:r>
+              <a:rPr lang="en-US" dirty="0"/>
+              <a:t>5</a:t>
+            </a:r>
+          </a:p>
+        </p:txBody>
+      </p:sp>
+    </p:spTree>
+    <p:extLst>
+      <p:ext uri="{BB962C8B-B14F-4D97-AF65-F5344CB8AC3E}">
+        <p14:creationId xmlns:p14="http://schemas.microsoft.com/office/powerpoint/2010/main" val="353985393"/>
       </p:ext>
     </p:extLst>
   </p:cSld>

</xml_diff>

<commit_message>
Added initial Toxyproxy client library impl Updated README
</commit_message>
<xml_diff>
--- a/test-automation-architecture.pptx
+++ b/test-automation-architecture.pptx
@@ -5104,7 +5104,18 @@
             <a:pPr algn="ctr"/>
             <a:r>
               <a:rPr lang="en-US" sz="1200" dirty="0" err="1"/>
-              <a:t>ProxyHelper.Add</a:t>
+              <a:t>ProxyHelper</a:t>
+            </a:r>
+            <a:br>
+              <a:rPr lang="en-US" sz="1200" dirty="0"/>
+            </a:br>
+            <a:r>
+              <a:rPr lang="en-US" sz="1200" dirty="0"/>
+              <a:t>.</a:t>
+            </a:r>
+            <a:r>
+              <a:rPr lang="en-US" sz="1200" dirty="0" err="1"/>
+              <a:t>AddAsync</a:t>
             </a:r>
             <a:r>
               <a:rPr lang="en-US" sz="1200" dirty="0"/>
@@ -5155,7 +5166,18 @@
             <a:pPr algn="ctr"/>
             <a:r>
               <a:rPr lang="en-US" sz="1200" dirty="0" err="1"/>
-              <a:t>ToxicHelper.Add</a:t>
+              <a:t>ToxicHelper</a:t>
+            </a:r>
+            <a:br>
+              <a:rPr lang="en-US" sz="1200" dirty="0"/>
+            </a:br>
+            <a:r>
+              <a:rPr lang="en-US" sz="1200" dirty="0"/>
+              <a:t>.</a:t>
+            </a:r>
+            <a:r>
+              <a:rPr lang="en-US" sz="1200" dirty="0" err="1"/>
+              <a:t>AddAsync</a:t>
             </a:r>
             <a:r>
               <a:rPr lang="en-US" sz="1200" dirty="0"/>
@@ -5178,8 +5200,8 @@
         </p:nvSpPr>
         <p:spPr>
           <a:xfrm>
-            <a:off x="2499787" y="5036406"/>
-            <a:ext cx="662041" cy="276999"/>
+            <a:off x="2215580" y="5036406"/>
+            <a:ext cx="1024768" cy="276999"/>
           </a:xfrm>
           <a:prstGeom prst="rect">
             <a:avLst/>
@@ -5194,7 +5216,15 @@
           <a:p>
             <a:r>
               <a:rPr lang="en-US" sz="1200" dirty="0"/>
-              <a:t>.Reset()</a:t>
+              <a:t>.</a:t>
+            </a:r>
+            <a:r>
+              <a:rPr lang="en-US" sz="1200" dirty="0" err="1"/>
+              <a:t>ResetAsync</a:t>
+            </a:r>
+            <a:r>
+              <a:rPr lang="en-US" sz="1200" dirty="0"/>
+              <a:t>()</a:t>
             </a:r>
           </a:p>
         </p:txBody>

</xml_diff>

<commit_message>
Improved readme and refactored a bit.
</commit_message>
<xml_diff>
--- a/test-automation-architecture.pptx
+++ b/test-automation-architecture.pptx
@@ -5,8 +5,9 @@
     <p:sldMasterId id="2147483648" r:id="rId1"/>
   </p:sldMasterIdLst>
   <p:sldIdLst>
-    <p:sldId id="257" r:id="rId2"/>
-    <p:sldId id="258" r:id="rId3"/>
+    <p:sldId id="259" r:id="rId2"/>
+    <p:sldId id="257" r:id="rId3"/>
+    <p:sldId id="258" r:id="rId4"/>
   </p:sldIdLst>
   <p:sldSz cx="12192000" cy="6858000"/>
   <p:notesSz cx="6858000" cy="9144000"/>
@@ -260,7 +261,7 @@
           <a:p>
             <a:fld id="{2F13CDE6-7281-BF40-8494-842FC3BE7F5D}" type="datetimeFigureOut">
               <a:rPr lang="en-US" smtClean="0"/>
-              <a:t>11/11/19</a:t>
+              <a:t>11/14/19</a:t>
             </a:fld>
             <a:endParaRPr lang="en-US"/>
           </a:p>
@@ -458,7 +459,7 @@
           <a:p>
             <a:fld id="{2F13CDE6-7281-BF40-8494-842FC3BE7F5D}" type="datetimeFigureOut">
               <a:rPr lang="en-US" smtClean="0"/>
-              <a:t>11/11/19</a:t>
+              <a:t>11/14/19</a:t>
             </a:fld>
             <a:endParaRPr lang="en-US"/>
           </a:p>
@@ -666,7 +667,7 @@
           <a:p>
             <a:fld id="{2F13CDE6-7281-BF40-8494-842FC3BE7F5D}" type="datetimeFigureOut">
               <a:rPr lang="en-US" smtClean="0"/>
-              <a:t>11/11/19</a:t>
+              <a:t>11/14/19</a:t>
             </a:fld>
             <a:endParaRPr lang="en-US"/>
           </a:p>
@@ -864,7 +865,7 @@
           <a:p>
             <a:fld id="{2F13CDE6-7281-BF40-8494-842FC3BE7F5D}" type="datetimeFigureOut">
               <a:rPr lang="en-US" smtClean="0"/>
-              <a:t>11/11/19</a:t>
+              <a:t>11/14/19</a:t>
             </a:fld>
             <a:endParaRPr lang="en-US"/>
           </a:p>
@@ -1139,7 +1140,7 @@
           <a:p>
             <a:fld id="{2F13CDE6-7281-BF40-8494-842FC3BE7F5D}" type="datetimeFigureOut">
               <a:rPr lang="en-US" smtClean="0"/>
-              <a:t>11/11/19</a:t>
+              <a:t>11/14/19</a:t>
             </a:fld>
             <a:endParaRPr lang="en-US"/>
           </a:p>
@@ -1404,7 +1405,7 @@
           <a:p>
             <a:fld id="{2F13CDE6-7281-BF40-8494-842FC3BE7F5D}" type="datetimeFigureOut">
               <a:rPr lang="en-US" smtClean="0"/>
-              <a:t>11/11/19</a:t>
+              <a:t>11/14/19</a:t>
             </a:fld>
             <a:endParaRPr lang="en-US"/>
           </a:p>
@@ -1816,7 +1817,7 @@
           <a:p>
             <a:fld id="{2F13CDE6-7281-BF40-8494-842FC3BE7F5D}" type="datetimeFigureOut">
               <a:rPr lang="en-US" smtClean="0"/>
-              <a:t>11/11/19</a:t>
+              <a:t>11/14/19</a:t>
             </a:fld>
             <a:endParaRPr lang="en-US"/>
           </a:p>
@@ -1957,7 +1958,7 @@
           <a:p>
             <a:fld id="{2F13CDE6-7281-BF40-8494-842FC3BE7F5D}" type="datetimeFigureOut">
               <a:rPr lang="en-US" smtClean="0"/>
-              <a:t>11/11/19</a:t>
+              <a:t>11/14/19</a:t>
             </a:fld>
             <a:endParaRPr lang="en-US"/>
           </a:p>
@@ -2070,7 +2071,7 @@
           <a:p>
             <a:fld id="{2F13CDE6-7281-BF40-8494-842FC3BE7F5D}" type="datetimeFigureOut">
               <a:rPr lang="en-US" smtClean="0"/>
-              <a:t>11/11/19</a:t>
+              <a:t>11/14/19</a:t>
             </a:fld>
             <a:endParaRPr lang="en-US"/>
           </a:p>
@@ -2381,7 +2382,7 @@
           <a:p>
             <a:fld id="{2F13CDE6-7281-BF40-8494-842FC3BE7F5D}" type="datetimeFigureOut">
               <a:rPr lang="en-US" smtClean="0"/>
-              <a:t>11/11/19</a:t>
+              <a:t>11/14/19</a:t>
             </a:fld>
             <a:endParaRPr lang="en-US"/>
           </a:p>
@@ -2669,7 +2670,7 @@
           <a:p>
             <a:fld id="{2F13CDE6-7281-BF40-8494-842FC3BE7F5D}" type="datetimeFigureOut">
               <a:rPr lang="en-US" smtClean="0"/>
-              <a:t>11/11/19</a:t>
+              <a:t>11/14/19</a:t>
             </a:fld>
             <a:endParaRPr lang="en-US"/>
           </a:p>
@@ -2910,7 +2911,7 @@
           <a:p>
             <a:fld id="{2F13CDE6-7281-BF40-8494-842FC3BE7F5D}" type="datetimeFigureOut">
               <a:rPr lang="en-US" smtClean="0"/>
-              <a:t>11/11/19</a:t>
+              <a:t>11/14/19</a:t>
             </a:fld>
             <a:endParaRPr lang="en-US"/>
           </a:p>
@@ -3327,6 +3328,1087 @@
           <a:chExt cx="0" cy="0"/>
         </a:xfrm>
       </p:grpSpPr>
+      <p:pic>
+        <p:nvPicPr>
+          <p:cNvPr id="12" name="Graphic 11" descr="Cloud">
+            <a:extLst>
+              <a:ext uri="{FF2B5EF4-FFF2-40B4-BE49-F238E27FC236}">
+                <a16:creationId xmlns:a16="http://schemas.microsoft.com/office/drawing/2014/main" id="{9066ECA7-BD07-484C-8F6E-A7B1B7D4D52F}"/>
+              </a:ext>
+            </a:extLst>
+          </p:cNvPr>
+          <p:cNvPicPr>
+            <a:picLocks noChangeAspect="1"/>
+          </p:cNvPicPr>
+          <p:nvPr/>
+        </p:nvPicPr>
+        <p:blipFill>
+          <a:blip r:embed="rId2">
+            <a:extLst>
+              <a:ext uri="{96DAC541-7B7A-43D3-8B79-37D633B846F1}">
+                <asvg:svgBlip xmlns:asvg="http://schemas.microsoft.com/office/drawing/2016/SVG/main" r:embed="rId3"/>
+              </a:ext>
+            </a:extLst>
+          </a:blip>
+          <a:stretch>
+            <a:fillRect/>
+          </a:stretch>
+        </p:blipFill>
+        <p:spPr>
+          <a:xfrm>
+            <a:off x="8357288" y="2851059"/>
+            <a:ext cx="914400" cy="914400"/>
+          </a:xfrm>
+          <a:prstGeom prst="rect">
+            <a:avLst/>
+          </a:prstGeom>
+        </p:spPr>
+      </p:pic>
+      <p:grpSp>
+        <p:nvGrpSpPr>
+          <p:cNvPr id="16" name="Group 15">
+            <a:extLst>
+              <a:ext uri="{FF2B5EF4-FFF2-40B4-BE49-F238E27FC236}">
+                <a16:creationId xmlns:a16="http://schemas.microsoft.com/office/drawing/2014/main" id="{DEE2CC13-9F9B-114C-BE1E-E779D13DB762}"/>
+              </a:ext>
+            </a:extLst>
+          </p:cNvPr>
+          <p:cNvGrpSpPr/>
+          <p:nvPr/>
+        </p:nvGrpSpPr>
+        <p:grpSpPr>
+          <a:xfrm>
+            <a:off x="2463114" y="1330410"/>
+            <a:ext cx="914400" cy="1217314"/>
+            <a:chOff x="1400433" y="1392194"/>
+            <a:chExt cx="914400" cy="1217314"/>
+          </a:xfrm>
+        </p:grpSpPr>
+        <p:pic>
+          <p:nvPicPr>
+            <p:cNvPr id="5" name="Graphic 4" descr="Server">
+              <a:extLst>
+                <a:ext uri="{FF2B5EF4-FFF2-40B4-BE49-F238E27FC236}">
+                  <a16:creationId xmlns:a16="http://schemas.microsoft.com/office/drawing/2014/main" id="{9CE49CC0-BA82-E447-B567-9A36A2C41030}"/>
+                </a:ext>
+              </a:extLst>
+            </p:cNvPr>
+            <p:cNvPicPr>
+              <a:picLocks noChangeAspect="1"/>
+            </p:cNvPicPr>
+            <p:nvPr/>
+          </p:nvPicPr>
+          <p:blipFill>
+            <a:blip r:embed="rId4">
+              <a:extLst>
+                <a:ext uri="{96DAC541-7B7A-43D3-8B79-37D633B846F1}">
+                  <asvg:svgBlip xmlns:asvg="http://schemas.microsoft.com/office/drawing/2016/SVG/main" r:embed="rId5"/>
+                </a:ext>
+              </a:extLst>
+            </a:blip>
+            <a:stretch>
+              <a:fillRect/>
+            </a:stretch>
+          </p:blipFill>
+          <p:spPr>
+            <a:xfrm>
+              <a:off x="1400433" y="1392194"/>
+              <a:ext cx="914400" cy="914400"/>
+            </a:xfrm>
+            <a:prstGeom prst="rect">
+              <a:avLst/>
+            </a:prstGeom>
+          </p:spPr>
+        </p:pic>
+        <p:sp>
+          <p:nvSpPr>
+            <p:cNvPr id="13" name="TextBox 12">
+              <a:extLst>
+                <a:ext uri="{FF2B5EF4-FFF2-40B4-BE49-F238E27FC236}">
+                  <a16:creationId xmlns:a16="http://schemas.microsoft.com/office/drawing/2014/main" id="{84274D8A-1C64-3F4E-A7FB-C8092D6A227E}"/>
+                </a:ext>
+              </a:extLst>
+            </p:cNvPr>
+            <p:cNvSpPr txBox="1"/>
+            <p:nvPr/>
+          </p:nvSpPr>
+          <p:spPr>
+            <a:xfrm>
+              <a:off x="1424333" y="2147843"/>
+              <a:ext cx="890500" cy="461665"/>
+            </a:xfrm>
+            <a:prstGeom prst="rect">
+              <a:avLst/>
+            </a:prstGeom>
+            <a:noFill/>
+          </p:spPr>
+          <p:txBody>
+            <a:bodyPr wrap="none" rtlCol="0">
+              <a:spAutoFit/>
+            </a:bodyPr>
+            <a:lstStyle/>
+            <a:p>
+              <a:pPr algn="ctr"/>
+              <a:r>
+                <a:rPr lang="en-US" sz="1200" dirty="0"/>
+                <a:t>Application</a:t>
+              </a:r>
+            </a:p>
+            <a:p>
+              <a:pPr algn="ctr"/>
+              <a:r>
+                <a:rPr lang="en-US" sz="1200" dirty="0"/>
+                <a:t>Server</a:t>
+              </a:r>
+            </a:p>
+          </p:txBody>
+        </p:sp>
+      </p:grpSp>
+      <p:grpSp>
+        <p:nvGrpSpPr>
+          <p:cNvPr id="15" name="Group 14">
+            <a:extLst>
+              <a:ext uri="{FF2B5EF4-FFF2-40B4-BE49-F238E27FC236}">
+                <a16:creationId xmlns:a16="http://schemas.microsoft.com/office/drawing/2014/main" id="{EF0C55CA-8B09-ED47-99A7-E85100127A70}"/>
+              </a:ext>
+            </a:extLst>
+          </p:cNvPr>
+          <p:cNvGrpSpPr/>
+          <p:nvPr/>
+        </p:nvGrpSpPr>
+        <p:grpSpPr>
+          <a:xfrm>
+            <a:off x="5960076" y="2849169"/>
+            <a:ext cx="914400" cy="1202893"/>
+            <a:chOff x="4897395" y="2547550"/>
+            <a:chExt cx="914400" cy="1202893"/>
+          </a:xfrm>
+        </p:grpSpPr>
+        <p:pic>
+          <p:nvPicPr>
+            <p:cNvPr id="10" name="Graphic 9" descr="Server">
+              <a:extLst>
+                <a:ext uri="{FF2B5EF4-FFF2-40B4-BE49-F238E27FC236}">
+                  <a16:creationId xmlns:a16="http://schemas.microsoft.com/office/drawing/2014/main" id="{90BDFE79-5354-C341-A520-2490CCC8893F}"/>
+                </a:ext>
+              </a:extLst>
+            </p:cNvPr>
+            <p:cNvPicPr>
+              <a:picLocks noChangeAspect="1"/>
+            </p:cNvPicPr>
+            <p:nvPr/>
+          </p:nvPicPr>
+          <p:blipFill>
+            <a:blip r:embed="rId4">
+              <a:extLst>
+                <a:ext uri="{96DAC541-7B7A-43D3-8B79-37D633B846F1}">
+                  <asvg:svgBlip xmlns:asvg="http://schemas.microsoft.com/office/drawing/2016/SVG/main" r:embed="rId5"/>
+                </a:ext>
+              </a:extLst>
+            </a:blip>
+            <a:stretch>
+              <a:fillRect/>
+            </a:stretch>
+          </p:blipFill>
+          <p:spPr>
+            <a:xfrm>
+              <a:off x="4897395" y="2547550"/>
+              <a:ext cx="914400" cy="914400"/>
+            </a:xfrm>
+            <a:prstGeom prst="rect">
+              <a:avLst/>
+            </a:prstGeom>
+          </p:spPr>
+        </p:pic>
+        <p:sp>
+          <p:nvSpPr>
+            <p:cNvPr id="14" name="TextBox 13">
+              <a:extLst>
+                <a:ext uri="{FF2B5EF4-FFF2-40B4-BE49-F238E27FC236}">
+                  <a16:creationId xmlns:a16="http://schemas.microsoft.com/office/drawing/2014/main" id="{4C84E9F1-B1DC-6649-AD35-E6EC1D57DC3F}"/>
+                </a:ext>
+              </a:extLst>
+            </p:cNvPr>
+            <p:cNvSpPr txBox="1"/>
+            <p:nvPr/>
+          </p:nvSpPr>
+          <p:spPr>
+            <a:xfrm>
+              <a:off x="4967983" y="3288778"/>
+              <a:ext cx="773225" cy="461665"/>
+            </a:xfrm>
+            <a:prstGeom prst="rect">
+              <a:avLst/>
+            </a:prstGeom>
+            <a:noFill/>
+          </p:spPr>
+          <p:txBody>
+            <a:bodyPr wrap="none" rtlCol="0">
+              <a:spAutoFit/>
+            </a:bodyPr>
+            <a:lstStyle/>
+            <a:p>
+              <a:pPr algn="ctr"/>
+              <a:r>
+                <a:rPr lang="en-US" sz="1200" dirty="0" err="1"/>
+                <a:t>Toxiproxy</a:t>
+              </a:r>
+              <a:endParaRPr lang="en-US" sz="1200" dirty="0"/>
+            </a:p>
+            <a:p>
+              <a:pPr algn="ctr"/>
+              <a:r>
+                <a:rPr lang="en-US" sz="1200" dirty="0"/>
+                <a:t>Server</a:t>
+              </a:r>
+            </a:p>
+          </p:txBody>
+        </p:sp>
+      </p:grpSp>
+      <p:grpSp>
+        <p:nvGrpSpPr>
+          <p:cNvPr id="17" name="Group 16">
+            <a:extLst>
+              <a:ext uri="{FF2B5EF4-FFF2-40B4-BE49-F238E27FC236}">
+                <a16:creationId xmlns:a16="http://schemas.microsoft.com/office/drawing/2014/main" id="{4E85AB5C-FDF5-3342-813B-41AEA66A06D1}"/>
+              </a:ext>
+            </a:extLst>
+          </p:cNvPr>
+          <p:cNvGrpSpPr/>
+          <p:nvPr/>
+        </p:nvGrpSpPr>
+        <p:grpSpPr>
+          <a:xfrm>
+            <a:off x="2463114" y="2849169"/>
+            <a:ext cx="914400" cy="1217314"/>
+            <a:chOff x="1400433" y="1392194"/>
+            <a:chExt cx="914400" cy="1217314"/>
+          </a:xfrm>
+        </p:grpSpPr>
+        <p:pic>
+          <p:nvPicPr>
+            <p:cNvPr id="18" name="Graphic 17" descr="Server">
+              <a:extLst>
+                <a:ext uri="{FF2B5EF4-FFF2-40B4-BE49-F238E27FC236}">
+                  <a16:creationId xmlns:a16="http://schemas.microsoft.com/office/drawing/2014/main" id="{7351F912-39F2-B443-90CA-06002338DD17}"/>
+                </a:ext>
+              </a:extLst>
+            </p:cNvPr>
+            <p:cNvPicPr>
+              <a:picLocks noChangeAspect="1"/>
+            </p:cNvPicPr>
+            <p:nvPr/>
+          </p:nvPicPr>
+          <p:blipFill>
+            <a:blip r:embed="rId4">
+              <a:extLst>
+                <a:ext uri="{96DAC541-7B7A-43D3-8B79-37D633B846F1}">
+                  <asvg:svgBlip xmlns:asvg="http://schemas.microsoft.com/office/drawing/2016/SVG/main" r:embed="rId5"/>
+                </a:ext>
+              </a:extLst>
+            </a:blip>
+            <a:stretch>
+              <a:fillRect/>
+            </a:stretch>
+          </p:blipFill>
+          <p:spPr>
+            <a:xfrm>
+              <a:off x="1400433" y="1392194"/>
+              <a:ext cx="914400" cy="914400"/>
+            </a:xfrm>
+            <a:prstGeom prst="rect">
+              <a:avLst/>
+            </a:prstGeom>
+          </p:spPr>
+        </p:pic>
+        <p:sp>
+          <p:nvSpPr>
+            <p:cNvPr id="19" name="TextBox 18">
+              <a:extLst>
+                <a:ext uri="{FF2B5EF4-FFF2-40B4-BE49-F238E27FC236}">
+                  <a16:creationId xmlns:a16="http://schemas.microsoft.com/office/drawing/2014/main" id="{652D4E72-69B6-3842-B7BB-28D1EEC14D00}"/>
+                </a:ext>
+              </a:extLst>
+            </p:cNvPr>
+            <p:cNvSpPr txBox="1"/>
+            <p:nvPr/>
+          </p:nvSpPr>
+          <p:spPr>
+            <a:xfrm>
+              <a:off x="1424333" y="2147843"/>
+              <a:ext cx="890500" cy="461665"/>
+            </a:xfrm>
+            <a:prstGeom prst="rect">
+              <a:avLst/>
+            </a:prstGeom>
+            <a:noFill/>
+          </p:spPr>
+          <p:txBody>
+            <a:bodyPr wrap="none" rtlCol="0">
+              <a:spAutoFit/>
+            </a:bodyPr>
+            <a:lstStyle/>
+            <a:p>
+              <a:pPr algn="ctr"/>
+              <a:r>
+                <a:rPr lang="en-US" sz="1200" dirty="0"/>
+                <a:t>Application</a:t>
+              </a:r>
+            </a:p>
+            <a:p>
+              <a:pPr algn="ctr"/>
+              <a:r>
+                <a:rPr lang="en-US" sz="1200" dirty="0"/>
+                <a:t>Server</a:t>
+              </a:r>
+            </a:p>
+          </p:txBody>
+        </p:sp>
+      </p:grpSp>
+      <p:grpSp>
+        <p:nvGrpSpPr>
+          <p:cNvPr id="20" name="Group 19">
+            <a:extLst>
+              <a:ext uri="{FF2B5EF4-FFF2-40B4-BE49-F238E27FC236}">
+                <a16:creationId xmlns:a16="http://schemas.microsoft.com/office/drawing/2014/main" id="{EFA3357E-A4EC-3649-84E0-FA5578221641}"/>
+              </a:ext>
+            </a:extLst>
+          </p:cNvPr>
+          <p:cNvGrpSpPr/>
+          <p:nvPr/>
+        </p:nvGrpSpPr>
+        <p:grpSpPr>
+          <a:xfrm>
+            <a:off x="2463114" y="4519218"/>
+            <a:ext cx="914400" cy="1217314"/>
+            <a:chOff x="1400433" y="1392194"/>
+            <a:chExt cx="914400" cy="1217314"/>
+          </a:xfrm>
+        </p:grpSpPr>
+        <p:pic>
+          <p:nvPicPr>
+            <p:cNvPr id="21" name="Graphic 20" descr="Server">
+              <a:extLst>
+                <a:ext uri="{FF2B5EF4-FFF2-40B4-BE49-F238E27FC236}">
+                  <a16:creationId xmlns:a16="http://schemas.microsoft.com/office/drawing/2014/main" id="{0ECC1237-2152-3641-A6CC-1648AD2653A9}"/>
+                </a:ext>
+              </a:extLst>
+            </p:cNvPr>
+            <p:cNvPicPr>
+              <a:picLocks noChangeAspect="1"/>
+            </p:cNvPicPr>
+            <p:nvPr/>
+          </p:nvPicPr>
+          <p:blipFill>
+            <a:blip r:embed="rId4">
+              <a:extLst>
+                <a:ext uri="{96DAC541-7B7A-43D3-8B79-37D633B846F1}">
+                  <asvg:svgBlip xmlns:asvg="http://schemas.microsoft.com/office/drawing/2016/SVG/main" r:embed="rId5"/>
+                </a:ext>
+              </a:extLst>
+            </a:blip>
+            <a:stretch>
+              <a:fillRect/>
+            </a:stretch>
+          </p:blipFill>
+          <p:spPr>
+            <a:xfrm>
+              <a:off x="1400433" y="1392194"/>
+              <a:ext cx="914400" cy="914400"/>
+            </a:xfrm>
+            <a:prstGeom prst="rect">
+              <a:avLst/>
+            </a:prstGeom>
+          </p:spPr>
+        </p:pic>
+        <p:sp>
+          <p:nvSpPr>
+            <p:cNvPr id="22" name="TextBox 21">
+              <a:extLst>
+                <a:ext uri="{FF2B5EF4-FFF2-40B4-BE49-F238E27FC236}">
+                  <a16:creationId xmlns:a16="http://schemas.microsoft.com/office/drawing/2014/main" id="{4B058367-B1C9-EE41-A1E5-D8C09057413E}"/>
+                </a:ext>
+              </a:extLst>
+            </p:cNvPr>
+            <p:cNvSpPr txBox="1"/>
+            <p:nvPr/>
+          </p:nvSpPr>
+          <p:spPr>
+            <a:xfrm>
+              <a:off x="1424333" y="2147843"/>
+              <a:ext cx="890500" cy="461665"/>
+            </a:xfrm>
+            <a:prstGeom prst="rect">
+              <a:avLst/>
+            </a:prstGeom>
+            <a:noFill/>
+          </p:spPr>
+          <p:txBody>
+            <a:bodyPr wrap="none" rtlCol="0">
+              <a:spAutoFit/>
+            </a:bodyPr>
+            <a:lstStyle/>
+            <a:p>
+              <a:pPr algn="ctr"/>
+              <a:r>
+                <a:rPr lang="en-US" sz="1200" dirty="0"/>
+                <a:t>Application</a:t>
+              </a:r>
+            </a:p>
+            <a:p>
+              <a:pPr algn="ctr"/>
+              <a:r>
+                <a:rPr lang="en-US" sz="1200" dirty="0"/>
+                <a:t>Server</a:t>
+              </a:r>
+            </a:p>
+          </p:txBody>
+        </p:sp>
+      </p:grpSp>
+      <p:cxnSp>
+        <p:nvCxnSpPr>
+          <p:cNvPr id="24" name="Elbow Connector 23">
+            <a:extLst>
+              <a:ext uri="{FF2B5EF4-FFF2-40B4-BE49-F238E27FC236}">
+                <a16:creationId xmlns:a16="http://schemas.microsoft.com/office/drawing/2014/main" id="{37763ADE-7B7E-314F-B2E0-020FBBEE9658}"/>
+              </a:ext>
+            </a:extLst>
+          </p:cNvPr>
+          <p:cNvCxnSpPr>
+            <a:stCxn id="5" idx="3"/>
+            <a:endCxn id="10" idx="1"/>
+          </p:cNvCxnSpPr>
+          <p:nvPr/>
+        </p:nvCxnSpPr>
+        <p:spPr>
+          <a:xfrm>
+            <a:off x="3377514" y="1787610"/>
+            <a:ext cx="2582562" cy="1518759"/>
+          </a:xfrm>
+          <a:prstGeom prst="bentConnector3">
+            <a:avLst/>
+          </a:prstGeom>
+          <a:ln>
+            <a:tailEnd type="triangle"/>
+          </a:ln>
+        </p:spPr>
+        <p:style>
+          <a:lnRef idx="1">
+            <a:schemeClr val="accent1"/>
+          </a:lnRef>
+          <a:fillRef idx="0">
+            <a:schemeClr val="accent1"/>
+          </a:fillRef>
+          <a:effectRef idx="0">
+            <a:schemeClr val="accent1"/>
+          </a:effectRef>
+          <a:fontRef idx="minor">
+            <a:schemeClr val="tx1"/>
+          </a:fontRef>
+        </p:style>
+      </p:cxnSp>
+      <p:cxnSp>
+        <p:nvCxnSpPr>
+          <p:cNvPr id="26" name="Elbow Connector 25">
+            <a:extLst>
+              <a:ext uri="{FF2B5EF4-FFF2-40B4-BE49-F238E27FC236}">
+                <a16:creationId xmlns:a16="http://schemas.microsoft.com/office/drawing/2014/main" id="{1E7B86E0-AD36-B745-8722-1A028DFDFFCB}"/>
+              </a:ext>
+            </a:extLst>
+          </p:cNvPr>
+          <p:cNvCxnSpPr>
+            <a:cxnSpLocks/>
+            <a:stCxn id="18" idx="3"/>
+          </p:cNvCxnSpPr>
+          <p:nvPr/>
+        </p:nvCxnSpPr>
+        <p:spPr>
+          <a:xfrm>
+            <a:off x="3377514" y="3306369"/>
+            <a:ext cx="2582562" cy="343"/>
+          </a:xfrm>
+          <a:prstGeom prst="bentConnector3">
+            <a:avLst/>
+          </a:prstGeom>
+          <a:ln>
+            <a:tailEnd type="triangle"/>
+          </a:ln>
+        </p:spPr>
+        <p:style>
+          <a:lnRef idx="1">
+            <a:schemeClr val="accent1"/>
+          </a:lnRef>
+          <a:fillRef idx="0">
+            <a:schemeClr val="accent1"/>
+          </a:fillRef>
+          <a:effectRef idx="0">
+            <a:schemeClr val="accent1"/>
+          </a:effectRef>
+          <a:fontRef idx="minor">
+            <a:schemeClr val="tx1"/>
+          </a:fontRef>
+        </p:style>
+      </p:cxnSp>
+      <p:cxnSp>
+        <p:nvCxnSpPr>
+          <p:cNvPr id="28" name="Elbow Connector 27">
+            <a:extLst>
+              <a:ext uri="{FF2B5EF4-FFF2-40B4-BE49-F238E27FC236}">
+                <a16:creationId xmlns:a16="http://schemas.microsoft.com/office/drawing/2014/main" id="{826F1A6F-1171-A24E-8E10-AF5F86A48309}"/>
+              </a:ext>
+            </a:extLst>
+          </p:cNvPr>
+          <p:cNvCxnSpPr>
+            <a:stCxn id="21" idx="3"/>
+            <a:endCxn id="10" idx="1"/>
+          </p:cNvCxnSpPr>
+          <p:nvPr/>
+        </p:nvCxnSpPr>
+        <p:spPr>
+          <a:xfrm flipV="1">
+            <a:off x="3377514" y="3306369"/>
+            <a:ext cx="2582562" cy="1670049"/>
+          </a:xfrm>
+          <a:prstGeom prst="bentConnector3">
+            <a:avLst/>
+          </a:prstGeom>
+          <a:ln>
+            <a:tailEnd type="triangle"/>
+          </a:ln>
+        </p:spPr>
+        <p:style>
+          <a:lnRef idx="1">
+            <a:schemeClr val="accent1"/>
+          </a:lnRef>
+          <a:fillRef idx="0">
+            <a:schemeClr val="accent1"/>
+          </a:fillRef>
+          <a:effectRef idx="0">
+            <a:schemeClr val="accent1"/>
+          </a:effectRef>
+          <a:fontRef idx="minor">
+            <a:schemeClr val="tx1"/>
+          </a:fontRef>
+        </p:style>
+      </p:cxnSp>
+      <p:cxnSp>
+        <p:nvCxnSpPr>
+          <p:cNvPr id="34" name="Straight Arrow Connector 33">
+            <a:extLst>
+              <a:ext uri="{FF2B5EF4-FFF2-40B4-BE49-F238E27FC236}">
+                <a16:creationId xmlns:a16="http://schemas.microsoft.com/office/drawing/2014/main" id="{DC6FEAF5-CFE6-BF48-8837-99217C2D1E3A}"/>
+              </a:ext>
+            </a:extLst>
+          </p:cNvPr>
+          <p:cNvCxnSpPr>
+            <a:stCxn id="10" idx="3"/>
+            <a:endCxn id="12" idx="1"/>
+          </p:cNvCxnSpPr>
+          <p:nvPr/>
+        </p:nvCxnSpPr>
+        <p:spPr>
+          <a:xfrm>
+            <a:off x="6874476" y="3306369"/>
+            <a:ext cx="1482812" cy="1890"/>
+          </a:xfrm>
+          <a:prstGeom prst="straightConnector1">
+            <a:avLst/>
+          </a:prstGeom>
+          <a:ln>
+            <a:tailEnd type="triangle"/>
+          </a:ln>
+        </p:spPr>
+        <p:style>
+          <a:lnRef idx="1">
+            <a:schemeClr val="accent1"/>
+          </a:lnRef>
+          <a:fillRef idx="0">
+            <a:schemeClr val="accent1"/>
+          </a:fillRef>
+          <a:effectRef idx="0">
+            <a:schemeClr val="accent1"/>
+          </a:effectRef>
+          <a:fontRef idx="minor">
+            <a:schemeClr val="tx1"/>
+          </a:fontRef>
+        </p:style>
+      </p:cxnSp>
+      <p:grpSp>
+        <p:nvGrpSpPr>
+          <p:cNvPr id="44" name="Group 43">
+            <a:extLst>
+              <a:ext uri="{FF2B5EF4-FFF2-40B4-BE49-F238E27FC236}">
+                <a16:creationId xmlns:a16="http://schemas.microsoft.com/office/drawing/2014/main" id="{0B6D5AB8-A139-364D-8CDB-7143AAF5CF6F}"/>
+              </a:ext>
+            </a:extLst>
+          </p:cNvPr>
+          <p:cNvGrpSpPr/>
+          <p:nvPr/>
+        </p:nvGrpSpPr>
+        <p:grpSpPr>
+          <a:xfrm>
+            <a:off x="4440193" y="873210"/>
+            <a:ext cx="914400" cy="914400"/>
+            <a:chOff x="7146324" y="1392194"/>
+            <a:chExt cx="914400" cy="914400"/>
+          </a:xfrm>
+        </p:grpSpPr>
+        <p:pic>
+          <p:nvPicPr>
+            <p:cNvPr id="9" name="Graphic 8" descr="Ethernet">
+              <a:extLst>
+                <a:ext uri="{FF2B5EF4-FFF2-40B4-BE49-F238E27FC236}">
+                  <a16:creationId xmlns:a16="http://schemas.microsoft.com/office/drawing/2014/main" id="{DFE6F810-D2EA-1946-B786-68A3BE43E933}"/>
+                </a:ext>
+              </a:extLst>
+            </p:cNvPr>
+            <p:cNvPicPr>
+              <a:picLocks noChangeAspect="1"/>
+            </p:cNvPicPr>
+            <p:nvPr/>
+          </p:nvPicPr>
+          <p:blipFill>
+            <a:blip r:embed="rId6">
+              <a:extLst>
+                <a:ext uri="{96DAC541-7B7A-43D3-8B79-37D633B846F1}">
+                  <asvg:svgBlip xmlns:asvg="http://schemas.microsoft.com/office/drawing/2016/SVG/main" r:embed="rId7"/>
+                </a:ext>
+              </a:extLst>
+            </a:blip>
+            <a:stretch>
+              <a:fillRect/>
+            </a:stretch>
+          </p:blipFill>
+          <p:spPr>
+            <a:xfrm>
+              <a:off x="7146324" y="1392194"/>
+              <a:ext cx="914400" cy="914400"/>
+            </a:xfrm>
+            <a:prstGeom prst="rect">
+              <a:avLst/>
+            </a:prstGeom>
+          </p:spPr>
+        </p:pic>
+        <p:sp>
+          <p:nvSpPr>
+            <p:cNvPr id="35" name="TextBox 34">
+              <a:extLst>
+                <a:ext uri="{FF2B5EF4-FFF2-40B4-BE49-F238E27FC236}">
+                  <a16:creationId xmlns:a16="http://schemas.microsoft.com/office/drawing/2014/main" id="{3DEAC045-8516-054F-A7F3-C36877AF8344}"/>
+                </a:ext>
+              </a:extLst>
+            </p:cNvPr>
+            <p:cNvSpPr txBox="1"/>
+            <p:nvPr/>
+          </p:nvSpPr>
+          <p:spPr>
+            <a:xfrm>
+              <a:off x="7356821" y="2029595"/>
+              <a:ext cx="493405" cy="276999"/>
+            </a:xfrm>
+            <a:prstGeom prst="rect">
+              <a:avLst/>
+            </a:prstGeom>
+            <a:noFill/>
+          </p:spPr>
+          <p:txBody>
+            <a:bodyPr wrap="none" rtlCol="0">
+              <a:spAutoFit/>
+            </a:bodyPr>
+            <a:lstStyle/>
+            <a:p>
+              <a:r>
+                <a:rPr lang="en-US" sz="1200" dirty="0"/>
+                <a:t>Toxic</a:t>
+              </a:r>
+            </a:p>
+          </p:txBody>
+        </p:sp>
+      </p:grpSp>
+      <p:cxnSp>
+        <p:nvCxnSpPr>
+          <p:cNvPr id="37" name="Straight Arrow Connector 36">
+            <a:extLst>
+              <a:ext uri="{FF2B5EF4-FFF2-40B4-BE49-F238E27FC236}">
+                <a16:creationId xmlns:a16="http://schemas.microsoft.com/office/drawing/2014/main" id="{E203C7B4-4FA2-9C46-A22B-1C3233644DD4}"/>
+              </a:ext>
+            </a:extLst>
+          </p:cNvPr>
+          <p:cNvCxnSpPr/>
+          <p:nvPr/>
+        </p:nvCxnSpPr>
+        <p:spPr>
+          <a:xfrm flipH="1" flipV="1">
+            <a:off x="3377514" y="3590397"/>
+            <a:ext cx="2582562" cy="14421"/>
+          </a:xfrm>
+          <a:prstGeom prst="straightConnector1">
+            <a:avLst/>
+          </a:prstGeom>
+          <a:ln>
+            <a:solidFill>
+              <a:srgbClr val="C00000"/>
+            </a:solidFill>
+            <a:tailEnd type="triangle"/>
+          </a:ln>
+        </p:spPr>
+        <p:style>
+          <a:lnRef idx="1">
+            <a:schemeClr val="accent1"/>
+          </a:lnRef>
+          <a:fillRef idx="0">
+            <a:schemeClr val="accent1"/>
+          </a:fillRef>
+          <a:effectRef idx="0">
+            <a:schemeClr val="accent1"/>
+          </a:effectRef>
+          <a:fontRef idx="minor">
+            <a:schemeClr val="tx1"/>
+          </a:fontRef>
+        </p:style>
+      </p:cxnSp>
+      <p:cxnSp>
+        <p:nvCxnSpPr>
+          <p:cNvPr id="39" name="Elbow Connector 38">
+            <a:extLst>
+              <a:ext uri="{FF2B5EF4-FFF2-40B4-BE49-F238E27FC236}">
+                <a16:creationId xmlns:a16="http://schemas.microsoft.com/office/drawing/2014/main" id="{15B05677-2A25-6346-B622-7E2D235A6813}"/>
+              </a:ext>
+            </a:extLst>
+          </p:cNvPr>
+          <p:cNvCxnSpPr>
+            <a:stCxn id="10" idx="0"/>
+          </p:cNvCxnSpPr>
+          <p:nvPr/>
+        </p:nvCxnSpPr>
+        <p:spPr>
+          <a:xfrm rot="16200000" flipV="1">
+            <a:off x="4132545" y="564438"/>
+            <a:ext cx="1529700" cy="3039762"/>
+          </a:xfrm>
+          <a:prstGeom prst="bentConnector2">
+            <a:avLst/>
+          </a:prstGeom>
+          <a:ln>
+            <a:solidFill>
+              <a:srgbClr val="C00000"/>
+            </a:solidFill>
+            <a:tailEnd type="triangle"/>
+          </a:ln>
+        </p:spPr>
+        <p:style>
+          <a:lnRef idx="1">
+            <a:schemeClr val="accent1"/>
+          </a:lnRef>
+          <a:fillRef idx="0">
+            <a:schemeClr val="accent1"/>
+          </a:fillRef>
+          <a:effectRef idx="0">
+            <a:schemeClr val="accent1"/>
+          </a:effectRef>
+          <a:fontRef idx="minor">
+            <a:schemeClr val="tx1"/>
+          </a:fontRef>
+        </p:style>
+      </p:cxnSp>
+      <p:cxnSp>
+        <p:nvCxnSpPr>
+          <p:cNvPr id="41" name="Elbow Connector 40">
+            <a:extLst>
+              <a:ext uri="{FF2B5EF4-FFF2-40B4-BE49-F238E27FC236}">
+                <a16:creationId xmlns:a16="http://schemas.microsoft.com/office/drawing/2014/main" id="{CC34BCC7-7E61-B646-B04F-37E7D54636C3}"/>
+              </a:ext>
+            </a:extLst>
+          </p:cNvPr>
+          <p:cNvCxnSpPr>
+            <a:stCxn id="14" idx="2"/>
+            <a:endCxn id="22" idx="3"/>
+          </p:cNvCxnSpPr>
+          <p:nvPr/>
+        </p:nvCxnSpPr>
+        <p:spPr>
+          <a:xfrm rot="5400000">
+            <a:off x="4170577" y="3259000"/>
+            <a:ext cx="1453638" cy="3039763"/>
+          </a:xfrm>
+          <a:prstGeom prst="bentConnector2">
+            <a:avLst/>
+          </a:prstGeom>
+          <a:ln>
+            <a:solidFill>
+              <a:srgbClr val="C00000"/>
+            </a:solidFill>
+            <a:tailEnd type="triangle"/>
+          </a:ln>
+        </p:spPr>
+        <p:style>
+          <a:lnRef idx="1">
+            <a:schemeClr val="accent1"/>
+          </a:lnRef>
+          <a:fillRef idx="0">
+            <a:schemeClr val="accent1"/>
+          </a:fillRef>
+          <a:effectRef idx="0">
+            <a:schemeClr val="accent1"/>
+          </a:effectRef>
+          <a:fontRef idx="minor">
+            <a:schemeClr val="tx1"/>
+          </a:fontRef>
+        </p:style>
+      </p:cxnSp>
+      <p:grpSp>
+        <p:nvGrpSpPr>
+          <p:cNvPr id="45" name="Group 44">
+            <a:extLst>
+              <a:ext uri="{FF2B5EF4-FFF2-40B4-BE49-F238E27FC236}">
+                <a16:creationId xmlns:a16="http://schemas.microsoft.com/office/drawing/2014/main" id="{5FD00EE2-2C01-DF43-8E5E-91DEF0B19919}"/>
+              </a:ext>
+            </a:extLst>
+          </p:cNvPr>
+          <p:cNvGrpSpPr/>
+          <p:nvPr/>
+        </p:nvGrpSpPr>
+        <p:grpSpPr>
+          <a:xfrm>
+            <a:off x="4930913" y="3172823"/>
+            <a:ext cx="914400" cy="914400"/>
+            <a:chOff x="7146324" y="1392194"/>
+            <a:chExt cx="914400" cy="914400"/>
+          </a:xfrm>
+        </p:grpSpPr>
+        <p:pic>
+          <p:nvPicPr>
+            <p:cNvPr id="46" name="Graphic 45" descr="Ethernet">
+              <a:extLst>
+                <a:ext uri="{FF2B5EF4-FFF2-40B4-BE49-F238E27FC236}">
+                  <a16:creationId xmlns:a16="http://schemas.microsoft.com/office/drawing/2014/main" id="{29CF9761-2EE2-5C4B-AD3D-69415C68D2E2}"/>
+                </a:ext>
+              </a:extLst>
+            </p:cNvPr>
+            <p:cNvPicPr>
+              <a:picLocks noChangeAspect="1"/>
+            </p:cNvPicPr>
+            <p:nvPr/>
+          </p:nvPicPr>
+          <p:blipFill>
+            <a:blip r:embed="rId6">
+              <a:extLst>
+                <a:ext uri="{96DAC541-7B7A-43D3-8B79-37D633B846F1}">
+                  <asvg:svgBlip xmlns:asvg="http://schemas.microsoft.com/office/drawing/2016/SVG/main" r:embed="rId7"/>
+                </a:ext>
+              </a:extLst>
+            </a:blip>
+            <a:stretch>
+              <a:fillRect/>
+            </a:stretch>
+          </p:blipFill>
+          <p:spPr>
+            <a:xfrm>
+              <a:off x="7146324" y="1392194"/>
+              <a:ext cx="914400" cy="914400"/>
+            </a:xfrm>
+            <a:prstGeom prst="rect">
+              <a:avLst/>
+            </a:prstGeom>
+          </p:spPr>
+        </p:pic>
+        <p:sp>
+          <p:nvSpPr>
+            <p:cNvPr id="47" name="TextBox 46">
+              <a:extLst>
+                <a:ext uri="{FF2B5EF4-FFF2-40B4-BE49-F238E27FC236}">
+                  <a16:creationId xmlns:a16="http://schemas.microsoft.com/office/drawing/2014/main" id="{AE13C694-66C4-844F-9A24-CA2EC02A6C0A}"/>
+                </a:ext>
+              </a:extLst>
+            </p:cNvPr>
+            <p:cNvSpPr txBox="1"/>
+            <p:nvPr/>
+          </p:nvSpPr>
+          <p:spPr>
+            <a:xfrm>
+              <a:off x="7356821" y="2029595"/>
+              <a:ext cx="493405" cy="276999"/>
+            </a:xfrm>
+            <a:prstGeom prst="rect">
+              <a:avLst/>
+            </a:prstGeom>
+            <a:noFill/>
+          </p:spPr>
+          <p:txBody>
+            <a:bodyPr wrap="none" rtlCol="0">
+              <a:spAutoFit/>
+            </a:bodyPr>
+            <a:lstStyle/>
+            <a:p>
+              <a:r>
+                <a:rPr lang="en-US" sz="1200" dirty="0"/>
+                <a:t>Toxic</a:t>
+              </a:r>
+            </a:p>
+          </p:txBody>
+        </p:sp>
+      </p:grpSp>
+      <p:grpSp>
+        <p:nvGrpSpPr>
+          <p:cNvPr id="48" name="Group 47">
+            <a:extLst>
+              <a:ext uri="{FF2B5EF4-FFF2-40B4-BE49-F238E27FC236}">
+                <a16:creationId xmlns:a16="http://schemas.microsoft.com/office/drawing/2014/main" id="{9EB65629-2B8D-2C42-A62A-2935F878AC23}"/>
+              </a:ext>
+            </a:extLst>
+          </p:cNvPr>
+          <p:cNvGrpSpPr/>
+          <p:nvPr/>
+        </p:nvGrpSpPr>
+        <p:grpSpPr>
+          <a:xfrm>
+            <a:off x="4440194" y="5048499"/>
+            <a:ext cx="914400" cy="914400"/>
+            <a:chOff x="7146324" y="1392194"/>
+            <a:chExt cx="914400" cy="914400"/>
+          </a:xfrm>
+        </p:grpSpPr>
+        <p:pic>
+          <p:nvPicPr>
+            <p:cNvPr id="49" name="Graphic 48" descr="Ethernet">
+              <a:extLst>
+                <a:ext uri="{FF2B5EF4-FFF2-40B4-BE49-F238E27FC236}">
+                  <a16:creationId xmlns:a16="http://schemas.microsoft.com/office/drawing/2014/main" id="{79FE6CF8-BEA0-CC40-A139-3E580CE7DD5B}"/>
+                </a:ext>
+              </a:extLst>
+            </p:cNvPr>
+            <p:cNvPicPr>
+              <a:picLocks noChangeAspect="1"/>
+            </p:cNvPicPr>
+            <p:nvPr/>
+          </p:nvPicPr>
+          <p:blipFill>
+            <a:blip r:embed="rId6">
+              <a:extLst>
+                <a:ext uri="{96DAC541-7B7A-43D3-8B79-37D633B846F1}">
+                  <asvg:svgBlip xmlns:asvg="http://schemas.microsoft.com/office/drawing/2016/SVG/main" r:embed="rId7"/>
+                </a:ext>
+              </a:extLst>
+            </a:blip>
+            <a:stretch>
+              <a:fillRect/>
+            </a:stretch>
+          </p:blipFill>
+          <p:spPr>
+            <a:xfrm>
+              <a:off x="7146324" y="1392194"/>
+              <a:ext cx="914400" cy="914400"/>
+            </a:xfrm>
+            <a:prstGeom prst="rect">
+              <a:avLst/>
+            </a:prstGeom>
+          </p:spPr>
+        </p:pic>
+        <p:sp>
+          <p:nvSpPr>
+            <p:cNvPr id="50" name="TextBox 49">
+              <a:extLst>
+                <a:ext uri="{FF2B5EF4-FFF2-40B4-BE49-F238E27FC236}">
+                  <a16:creationId xmlns:a16="http://schemas.microsoft.com/office/drawing/2014/main" id="{D36F6F3D-3DC4-9043-9968-60EC859B3F94}"/>
+                </a:ext>
+              </a:extLst>
+            </p:cNvPr>
+            <p:cNvSpPr txBox="1"/>
+            <p:nvPr/>
+          </p:nvSpPr>
+          <p:spPr>
+            <a:xfrm>
+              <a:off x="7356821" y="2029595"/>
+              <a:ext cx="493405" cy="276999"/>
+            </a:xfrm>
+            <a:prstGeom prst="rect">
+              <a:avLst/>
+            </a:prstGeom>
+            <a:noFill/>
+          </p:spPr>
+          <p:txBody>
+            <a:bodyPr wrap="none" rtlCol="0">
+              <a:spAutoFit/>
+            </a:bodyPr>
+            <a:lstStyle/>
+            <a:p>
+              <a:r>
+                <a:rPr lang="en-US" sz="1200" dirty="0"/>
+                <a:t>Toxic</a:t>
+              </a:r>
+            </a:p>
+          </p:txBody>
+        </p:sp>
+      </p:grpSp>
+      <p:cxnSp>
+        <p:nvCxnSpPr>
+          <p:cNvPr id="52" name="Straight Arrow Connector 51">
+            <a:extLst>
+              <a:ext uri="{FF2B5EF4-FFF2-40B4-BE49-F238E27FC236}">
+                <a16:creationId xmlns:a16="http://schemas.microsoft.com/office/drawing/2014/main" id="{2D37F024-7B1E-D342-8771-50A890A226BE}"/>
+              </a:ext>
+            </a:extLst>
+          </p:cNvPr>
+          <p:cNvCxnSpPr/>
+          <p:nvPr/>
+        </p:nvCxnSpPr>
+        <p:spPr>
+          <a:xfrm flipH="1">
+            <a:off x="6874476" y="3429000"/>
+            <a:ext cx="1482812" cy="0"/>
+          </a:xfrm>
+          <a:prstGeom prst="straightConnector1">
+            <a:avLst/>
+          </a:prstGeom>
+          <a:ln>
+            <a:tailEnd type="triangle"/>
+          </a:ln>
+        </p:spPr>
+        <p:style>
+          <a:lnRef idx="1">
+            <a:schemeClr val="accent1"/>
+          </a:lnRef>
+          <a:fillRef idx="0">
+            <a:schemeClr val="accent1"/>
+          </a:fillRef>
+          <a:effectRef idx="0">
+            <a:schemeClr val="accent1"/>
+          </a:effectRef>
+          <a:fontRef idx="minor">
+            <a:schemeClr val="tx1"/>
+          </a:fontRef>
+        </p:style>
+      </p:cxnSp>
+    </p:spTree>
+    <p:extLst>
+      <p:ext uri="{BB962C8B-B14F-4D97-AF65-F5344CB8AC3E}">
+        <p14:creationId xmlns:p14="http://schemas.microsoft.com/office/powerpoint/2010/main" val="508921928"/>
+      </p:ext>
+    </p:extLst>
+  </p:cSld>
+  <p:clrMapOvr>
+    <a:masterClrMapping/>
+  </p:clrMapOvr>
+</p:sld>
+</file>
+
+<file path=ppt/slides/slide2.xml><?xml version="1.0" encoding="utf-8"?>
+<p:sld xmlns:a="http://schemas.openxmlformats.org/drawingml/2006/main" xmlns:r="http://schemas.openxmlformats.org/officeDocument/2006/relationships" xmlns:p="http://schemas.openxmlformats.org/presentationml/2006/main">
+  <p:cSld>
+    <p:spTree>
+      <p:nvGrpSpPr>
+        <p:cNvPr id="1" name=""/>
+        <p:cNvGrpSpPr/>
+        <p:nvPr/>
+      </p:nvGrpSpPr>
+      <p:grpSpPr>
+        <a:xfrm>
+          <a:off x="0" y="0"/>
+          <a:ext cx="0" cy="0"/>
+          <a:chOff x="0" y="0"/>
+          <a:chExt cx="0" cy="0"/>
+        </a:xfrm>
+      </p:grpSpPr>
       <p:sp>
         <p:nvSpPr>
           <p:cNvPr id="43" name="Rectangle 42">
@@ -4832,7 +5914,7 @@
 </p:sld>
 </file>
 
-<file path=ppt/slides/slide2.xml><?xml version="1.0" encoding="utf-8"?>
+<file path=ppt/slides/slide3.xml><?xml version="1.0" encoding="utf-8"?>
 <p:sld xmlns:a="http://schemas.openxmlformats.org/drawingml/2006/main" xmlns:r="http://schemas.openxmlformats.org/officeDocument/2006/relationships" xmlns:p="http://schemas.openxmlformats.org/presentationml/2006/main">
   <p:cSld>
     <p:spTree>

</xml_diff>